<commit_message>
Minor additions to margins presentation
</commit_message>
<xml_diff>
--- a/Margins.pptx
+++ b/Margins.pptx
@@ -9,19 +9,20 @@
     <p:sldId id="257" r:id="rId3"/>
     <p:sldId id="258" r:id="rId4"/>
     <p:sldId id="264" r:id="rId5"/>
-    <p:sldId id="259" r:id="rId6"/>
-    <p:sldId id="260" r:id="rId7"/>
-    <p:sldId id="261" r:id="rId8"/>
-    <p:sldId id="262" r:id="rId9"/>
-    <p:sldId id="263" r:id="rId10"/>
-    <p:sldId id="265" r:id="rId11"/>
-    <p:sldId id="266" r:id="rId12"/>
-    <p:sldId id="267" r:id="rId13"/>
-    <p:sldId id="268" r:id="rId14"/>
-    <p:sldId id="269" r:id="rId15"/>
-    <p:sldId id="272" r:id="rId16"/>
-    <p:sldId id="270" r:id="rId17"/>
-    <p:sldId id="271" r:id="rId18"/>
+    <p:sldId id="273" r:id="rId6"/>
+    <p:sldId id="259" r:id="rId7"/>
+    <p:sldId id="260" r:id="rId8"/>
+    <p:sldId id="261" r:id="rId9"/>
+    <p:sldId id="262" r:id="rId10"/>
+    <p:sldId id="263" r:id="rId11"/>
+    <p:sldId id="265" r:id="rId12"/>
+    <p:sldId id="266" r:id="rId13"/>
+    <p:sldId id="267" r:id="rId14"/>
+    <p:sldId id="268" r:id="rId15"/>
+    <p:sldId id="269" r:id="rId16"/>
+    <p:sldId id="272" r:id="rId17"/>
+    <p:sldId id="270" r:id="rId18"/>
+    <p:sldId id="271" r:id="rId19"/>
   </p:sldIdLst>
   <p:sldSz cx="9144000" cy="6858000" type="screen4x3"/>
   <p:notesSz cx="6858000" cy="9144000"/>
@@ -120,6 +121,11 @@
       </a:defRPr>
     </a:lvl9pPr>
   </p:defaultTextStyle>
+  <p:extLst>
+    <p:ext uri="{EFAFB233-063F-42B5-8137-9DF3F51BA10A}">
+      <p15:sldGuideLst xmlns:p15="http://schemas.microsoft.com/office/powerpoint/2012/main"/>
+    </p:ext>
+  </p:extLst>
 </p:presentation>
 </file>
 
@@ -302,7 +308,7 @@
           <a:p>
             <a:fld id="{51B3E87B-4CFA-4F74-BCC6-A538550D3DDB}" type="datetimeFigureOut">
               <a:rPr lang="en-US" smtClean="0"/>
-              <a:t>9/3/2018</a:t>
+              <a:t>10/21/2018</a:t>
             </a:fld>
             <a:endParaRPr lang="en-US"/>
           </a:p>
@@ -470,7 +476,7 @@
           <a:p>
             <a:fld id="{51B3E87B-4CFA-4F74-BCC6-A538550D3DDB}" type="datetimeFigureOut">
               <a:rPr lang="en-US" smtClean="0"/>
-              <a:t>9/3/2018</a:t>
+              <a:t>10/21/2018</a:t>
             </a:fld>
             <a:endParaRPr lang="en-US"/>
           </a:p>
@@ -648,7 +654,7 @@
           <a:p>
             <a:fld id="{51B3E87B-4CFA-4F74-BCC6-A538550D3DDB}" type="datetimeFigureOut">
               <a:rPr lang="en-US" smtClean="0"/>
-              <a:t>9/3/2018</a:t>
+              <a:t>10/21/2018</a:t>
             </a:fld>
             <a:endParaRPr lang="en-US"/>
           </a:p>
@@ -816,7 +822,7 @@
           <a:p>
             <a:fld id="{51B3E87B-4CFA-4F74-BCC6-A538550D3DDB}" type="datetimeFigureOut">
               <a:rPr lang="en-US" smtClean="0"/>
-              <a:t>9/3/2018</a:t>
+              <a:t>10/21/2018</a:t>
             </a:fld>
             <a:endParaRPr lang="en-US"/>
           </a:p>
@@ -1061,7 +1067,7 @@
           <a:p>
             <a:fld id="{51B3E87B-4CFA-4F74-BCC6-A538550D3DDB}" type="datetimeFigureOut">
               <a:rPr lang="en-US" smtClean="0"/>
-              <a:t>9/3/2018</a:t>
+              <a:t>10/21/2018</a:t>
             </a:fld>
             <a:endParaRPr lang="en-US"/>
           </a:p>
@@ -1346,7 +1352,7 @@
           <a:p>
             <a:fld id="{51B3E87B-4CFA-4F74-BCC6-A538550D3DDB}" type="datetimeFigureOut">
               <a:rPr lang="en-US" smtClean="0"/>
-              <a:t>9/3/2018</a:t>
+              <a:t>10/21/2018</a:t>
             </a:fld>
             <a:endParaRPr lang="en-US"/>
           </a:p>
@@ -1765,7 +1771,7 @@
           <a:p>
             <a:fld id="{51B3E87B-4CFA-4F74-BCC6-A538550D3DDB}" type="datetimeFigureOut">
               <a:rPr lang="en-US" smtClean="0"/>
-              <a:t>9/3/2018</a:t>
+              <a:t>10/21/2018</a:t>
             </a:fld>
             <a:endParaRPr lang="en-US"/>
           </a:p>
@@ -1882,7 +1888,7 @@
           <a:p>
             <a:fld id="{51B3E87B-4CFA-4F74-BCC6-A538550D3DDB}" type="datetimeFigureOut">
               <a:rPr lang="en-US" smtClean="0"/>
-              <a:t>9/3/2018</a:t>
+              <a:t>10/21/2018</a:t>
             </a:fld>
             <a:endParaRPr lang="en-US"/>
           </a:p>
@@ -1977,7 +1983,7 @@
           <a:p>
             <a:fld id="{51B3E87B-4CFA-4F74-BCC6-A538550D3DDB}" type="datetimeFigureOut">
               <a:rPr lang="en-US" smtClean="0"/>
-              <a:t>9/3/2018</a:t>
+              <a:t>10/21/2018</a:t>
             </a:fld>
             <a:endParaRPr lang="en-US"/>
           </a:p>
@@ -2252,7 +2258,7 @@
           <a:p>
             <a:fld id="{51B3E87B-4CFA-4F74-BCC6-A538550D3DDB}" type="datetimeFigureOut">
               <a:rPr lang="en-US" smtClean="0"/>
-              <a:t>9/3/2018</a:t>
+              <a:t>10/21/2018</a:t>
             </a:fld>
             <a:endParaRPr lang="en-US"/>
           </a:p>
@@ -2507,7 +2513,7 @@
           <a:p>
             <a:fld id="{51B3E87B-4CFA-4F74-BCC6-A538550D3DDB}" type="datetimeFigureOut">
               <a:rPr lang="en-US" smtClean="0"/>
-              <a:t>9/3/2018</a:t>
+              <a:t>10/21/2018</a:t>
             </a:fld>
             <a:endParaRPr lang="en-US"/>
           </a:p>
@@ -2721,7 +2727,7 @@
           <a:p>
             <a:fld id="{51B3E87B-4CFA-4F74-BCC6-A538550D3DDB}" type="datetimeFigureOut">
               <a:rPr lang="en-US" smtClean="0"/>
-              <a:t>9/3/2018</a:t>
+              <a:t>10/21/2018</a:t>
             </a:fld>
             <a:endParaRPr lang="en-US"/>
           </a:p>
@@ -3190,6 +3196,13 @@
   <p:clrMapOvr>
     <a:masterClrMapping/>
   </p:clrMapOvr>
+  <p:timing>
+    <p:tnLst>
+      <p:par>
+        <p:cTn id="1" dur="indefinite" restart="never" nodeType="tmRoot"/>
+      </p:par>
+    </p:tnLst>
+  </p:timing>
 </p:sld>
 </file>
 
@@ -3233,7 +3246,7 @@
           <a:p>
             <a:r>
               <a:rPr lang="en-US" dirty="0"/>
-              <a:t>Basic Mass</a:t>
+              <a:t>Allowable Mass</a:t>
             </a:r>
           </a:p>
         </p:txBody>
@@ -3262,33 +3275,45 @@
         </p:spPr>
         <p:txBody>
           <a:bodyPr>
-            <a:normAutofit/>
+            <a:normAutofit lnSpcReduction="10000"/>
           </a:bodyPr>
           <a:lstStyle/>
           <a:p>
             <a:r>
+              <a:rPr lang="en-US" sz="2800" dirty="0"/>
+              <a:t>The mission limit minus the mass reserve</a:t>
+            </a:r>
+          </a:p>
+          <a:p>
+            <a:r>
+              <a:rPr lang="en-US" sz="2800" dirty="0"/>
+              <a:t>The mass that “you have to work with”</a:t>
+            </a:r>
+          </a:p>
+          <a:p>
+            <a:r>
+              <a:rPr lang="en-US" sz="2800" dirty="0"/>
+              <a:t>This is allocated out to subsystems</a:t>
+            </a:r>
+          </a:p>
+          <a:p>
+            <a:pPr lvl="1"/>
+            <a:r>
               <a:rPr lang="en-US" sz="2400" dirty="0"/>
-              <a:t>In archaic JPL parlance, “current best estimate”</a:t>
-            </a:r>
-          </a:p>
-          <a:p>
+              <a:t>Chunks of it are then allocated out to e.g. boxes</a:t>
+            </a:r>
+          </a:p>
+          <a:p>
+            <a:r>
+              <a:rPr lang="en-US" sz="2800" dirty="0"/>
+              <a:t>No need to allocate less than 100% of allowable mass</a:t>
+            </a:r>
+          </a:p>
+          <a:p>
+            <a:pPr lvl="1"/>
             <a:r>
               <a:rPr lang="en-US" sz="2400" dirty="0"/>
-              <a:t>What you think the mass of your (subsystem/ box/ component) is</a:t>
-            </a:r>
-          </a:p>
-          <a:p>
-            <a:r>
-              <a:rPr lang="en-US" sz="2400" dirty="0"/>
-              <a:t>I.e., “if I open it in </a:t>
-            </a:r>
-            <a:r>
-              <a:rPr lang="en-US" sz="2400" dirty="0" err="1"/>
-              <a:t>Solidworks</a:t>
-            </a:r>
-            <a:r>
-              <a:rPr lang="en-US" sz="2400" dirty="0"/>
-              <a:t> and hit the ‘Mass Properties’ button, what does it say?”</a:t>
+              <a:t>That’s what mass margin is for</a:t>
             </a:r>
           </a:p>
         </p:txBody>
@@ -3721,7 +3746,7 @@
           <p:spPr>
             <a:xfrm>
               <a:off x="4286774" y="4428251"/>
-              <a:ext cx="2410553" cy="601875"/>
+              <a:ext cx="1539204" cy="461665"/>
             </a:xfrm>
             <a:prstGeom prst="rect">
               <a:avLst/>
@@ -3737,7 +3762,7 @@
               <a:r>
                 <a:rPr lang="en-US" sz="2400" dirty="0">
                   <a:solidFill>
-                    <a:srgbClr val="FF0000"/>
+                    <a:schemeClr val="bg1"/>
                   </a:solidFill>
                 </a:rPr>
                 <a:t>Basic Mass</a:t>
@@ -3932,7 +3957,7 @@
               <a:r>
                 <a:rPr lang="en-US" sz="2400" dirty="0">
                   <a:solidFill>
-                    <a:schemeClr val="bg1"/>
+                    <a:srgbClr val="FF0000"/>
                   </a:solidFill>
                 </a:rPr>
                 <a:t>Allowable Mass</a:t>
@@ -4022,13 +4047,20 @@
     </p:spTree>
     <p:extLst>
       <p:ext uri="{BB962C8B-B14F-4D97-AF65-F5344CB8AC3E}">
-        <p14:creationId xmlns:p14="http://schemas.microsoft.com/office/powerpoint/2010/main" val="1489339135"/>
+        <p14:creationId xmlns:p14="http://schemas.microsoft.com/office/powerpoint/2010/main" val="73504398"/>
       </p:ext>
     </p:extLst>
   </p:cSld>
   <p:clrMapOvr>
     <a:masterClrMapping/>
   </p:clrMapOvr>
+  <p:timing>
+    <p:tnLst>
+      <p:par>
+        <p:cTn id="1" dur="indefinite" restart="never" nodeType="tmRoot"/>
+      </p:par>
+    </p:tnLst>
+  </p:timing>
 </p:sld>
 </file>
 
@@ -4072,6 +4104,852 @@
           <a:p>
             <a:r>
               <a:rPr lang="en-US" dirty="0"/>
+              <a:t>Basic Mass</a:t>
+            </a:r>
+          </a:p>
+        </p:txBody>
+      </p:sp>
+      <p:sp>
+        <p:nvSpPr>
+          <p:cNvPr id="3" name="Content Placeholder 2">
+            <a:extLst>
+              <a:ext uri="{FF2B5EF4-FFF2-40B4-BE49-F238E27FC236}">
+                <a16:creationId xmlns:a16="http://schemas.microsoft.com/office/drawing/2014/main" id="{205F8E24-BEB0-438B-BFD9-83AEDD7D6EC5}"/>
+              </a:ext>
+            </a:extLst>
+          </p:cNvPr>
+          <p:cNvSpPr>
+            <a:spLocks noGrp="1"/>
+          </p:cNvSpPr>
+          <p:nvPr>
+            <p:ph idx="1"/>
+          </p:nvPr>
+        </p:nvSpPr>
+        <p:spPr>
+          <a:xfrm>
+            <a:off x="4718679" y="1166949"/>
+            <a:ext cx="4304413" cy="5337089"/>
+          </a:xfrm>
+        </p:spPr>
+        <p:txBody>
+          <a:bodyPr>
+            <a:normAutofit/>
+          </a:bodyPr>
+          <a:lstStyle/>
+          <a:p>
+            <a:r>
+              <a:rPr lang="en-US" sz="2400" dirty="0"/>
+              <a:t>In archaic JPL parlance, “current best estimate”</a:t>
+            </a:r>
+          </a:p>
+          <a:p>
+            <a:r>
+              <a:rPr lang="en-US" sz="2400" dirty="0"/>
+              <a:t>What you think the mass of your (subsystem/ box/ component) is</a:t>
+            </a:r>
+          </a:p>
+          <a:p>
+            <a:r>
+              <a:rPr lang="en-US" sz="2400" dirty="0"/>
+              <a:t>I.e., “if I open it in </a:t>
+            </a:r>
+            <a:r>
+              <a:rPr lang="en-US" sz="2400" dirty="0" err="1"/>
+              <a:t>Solidworks</a:t>
+            </a:r>
+            <a:r>
+              <a:rPr lang="en-US" sz="2400" dirty="0"/>
+              <a:t> and hit the ‘Mass Properties’ button, what does it say?”</a:t>
+            </a:r>
+          </a:p>
+        </p:txBody>
+      </p:sp>
+      <p:grpSp>
+        <p:nvGrpSpPr>
+          <p:cNvPr id="4" name="Group 3">
+            <a:extLst>
+              <a:ext uri="{FF2B5EF4-FFF2-40B4-BE49-F238E27FC236}">
+                <a16:creationId xmlns:a16="http://schemas.microsoft.com/office/drawing/2014/main" id="{0C188F93-B9B3-48F0-9167-6CB36979790B}"/>
+              </a:ext>
+            </a:extLst>
+          </p:cNvPr>
+          <p:cNvGrpSpPr/>
+          <p:nvPr/>
+        </p:nvGrpSpPr>
+        <p:grpSpPr>
+          <a:xfrm>
+            <a:off x="136195" y="1071525"/>
+            <a:ext cx="4428669" cy="4036423"/>
+            <a:chOff x="722811" y="1447707"/>
+            <a:chExt cx="6935754" cy="5262302"/>
+          </a:xfrm>
+        </p:grpSpPr>
+        <p:cxnSp>
+          <p:nvCxnSpPr>
+            <p:cNvPr id="5" name="Straight Connector 4">
+              <a:extLst>
+                <a:ext uri="{FF2B5EF4-FFF2-40B4-BE49-F238E27FC236}">
+                  <a16:creationId xmlns:a16="http://schemas.microsoft.com/office/drawing/2014/main" id="{7AA86E86-12FC-42EA-A0D7-287C59FDF7C8}"/>
+                </a:ext>
+              </a:extLst>
+            </p:cNvPr>
+            <p:cNvCxnSpPr>
+              <a:cxnSpLocks/>
+            </p:cNvCxnSpPr>
+            <p:nvPr/>
+          </p:nvCxnSpPr>
+          <p:spPr>
+            <a:xfrm>
+              <a:off x="722811" y="1672046"/>
+              <a:ext cx="3640183" cy="0"/>
+            </a:xfrm>
+            <a:prstGeom prst="line">
+              <a:avLst/>
+            </a:prstGeom>
+            <a:ln w="25400">
+              <a:solidFill>
+                <a:schemeClr val="bg1"/>
+              </a:solidFill>
+            </a:ln>
+          </p:spPr>
+          <p:style>
+            <a:lnRef idx="1">
+              <a:schemeClr val="accent1"/>
+            </a:lnRef>
+            <a:fillRef idx="0">
+              <a:schemeClr val="accent1"/>
+            </a:fillRef>
+            <a:effectRef idx="0">
+              <a:schemeClr val="accent1"/>
+            </a:effectRef>
+            <a:fontRef idx="minor">
+              <a:schemeClr val="tx1"/>
+            </a:fontRef>
+          </p:style>
+        </p:cxnSp>
+        <p:cxnSp>
+          <p:nvCxnSpPr>
+            <p:cNvPr id="6" name="Straight Connector 5">
+              <a:extLst>
+                <a:ext uri="{FF2B5EF4-FFF2-40B4-BE49-F238E27FC236}">
+                  <a16:creationId xmlns:a16="http://schemas.microsoft.com/office/drawing/2014/main" id="{CC89B743-B611-43BF-A56C-6CFC4059482C}"/>
+                </a:ext>
+              </a:extLst>
+            </p:cNvPr>
+            <p:cNvCxnSpPr>
+              <a:cxnSpLocks/>
+            </p:cNvCxnSpPr>
+            <p:nvPr/>
+          </p:nvCxnSpPr>
+          <p:spPr>
+            <a:xfrm>
+              <a:off x="722811" y="2656115"/>
+              <a:ext cx="3640183" cy="0"/>
+            </a:xfrm>
+            <a:prstGeom prst="line">
+              <a:avLst/>
+            </a:prstGeom>
+            <a:ln w="25400">
+              <a:solidFill>
+                <a:schemeClr val="bg1"/>
+              </a:solidFill>
+            </a:ln>
+          </p:spPr>
+          <p:style>
+            <a:lnRef idx="1">
+              <a:schemeClr val="accent1"/>
+            </a:lnRef>
+            <a:fillRef idx="0">
+              <a:schemeClr val="accent1"/>
+            </a:fillRef>
+            <a:effectRef idx="0">
+              <a:schemeClr val="accent1"/>
+            </a:effectRef>
+            <a:fontRef idx="minor">
+              <a:schemeClr val="tx1"/>
+            </a:fontRef>
+          </p:style>
+        </p:cxnSp>
+        <p:cxnSp>
+          <p:nvCxnSpPr>
+            <p:cNvPr id="7" name="Straight Connector 6">
+              <a:extLst>
+                <a:ext uri="{FF2B5EF4-FFF2-40B4-BE49-F238E27FC236}">
+                  <a16:creationId xmlns:a16="http://schemas.microsoft.com/office/drawing/2014/main" id="{3B5DF38E-5B65-439F-B862-FD961DA0D30A}"/>
+                </a:ext>
+              </a:extLst>
+            </p:cNvPr>
+            <p:cNvCxnSpPr>
+              <a:cxnSpLocks/>
+            </p:cNvCxnSpPr>
+            <p:nvPr/>
+          </p:nvCxnSpPr>
+          <p:spPr>
+            <a:xfrm>
+              <a:off x="722811" y="3579223"/>
+              <a:ext cx="3640183" cy="0"/>
+            </a:xfrm>
+            <a:prstGeom prst="line">
+              <a:avLst/>
+            </a:prstGeom>
+            <a:ln w="25400">
+              <a:solidFill>
+                <a:schemeClr val="bg1"/>
+              </a:solidFill>
+            </a:ln>
+          </p:spPr>
+          <p:style>
+            <a:lnRef idx="1">
+              <a:schemeClr val="accent1"/>
+            </a:lnRef>
+            <a:fillRef idx="0">
+              <a:schemeClr val="accent1"/>
+            </a:fillRef>
+            <a:effectRef idx="0">
+              <a:schemeClr val="accent1"/>
+            </a:effectRef>
+            <a:fontRef idx="minor">
+              <a:schemeClr val="tx1"/>
+            </a:fontRef>
+          </p:style>
+        </p:cxnSp>
+        <p:cxnSp>
+          <p:nvCxnSpPr>
+            <p:cNvPr id="8" name="Straight Connector 7">
+              <a:extLst>
+                <a:ext uri="{FF2B5EF4-FFF2-40B4-BE49-F238E27FC236}">
+                  <a16:creationId xmlns:a16="http://schemas.microsoft.com/office/drawing/2014/main" id="{661FC51B-75F7-4975-AEB7-43786A4A76EA}"/>
+                </a:ext>
+              </a:extLst>
+            </p:cNvPr>
+            <p:cNvCxnSpPr>
+              <a:cxnSpLocks/>
+            </p:cNvCxnSpPr>
+            <p:nvPr/>
+          </p:nvCxnSpPr>
+          <p:spPr>
+            <a:xfrm>
+              <a:off x="722811" y="4659086"/>
+              <a:ext cx="3640183" cy="0"/>
+            </a:xfrm>
+            <a:prstGeom prst="line">
+              <a:avLst/>
+            </a:prstGeom>
+            <a:ln w="25400">
+              <a:solidFill>
+                <a:schemeClr val="bg1"/>
+              </a:solidFill>
+            </a:ln>
+          </p:spPr>
+          <p:style>
+            <a:lnRef idx="1">
+              <a:schemeClr val="accent1"/>
+            </a:lnRef>
+            <a:fillRef idx="0">
+              <a:schemeClr val="accent1"/>
+            </a:fillRef>
+            <a:effectRef idx="0">
+              <a:schemeClr val="accent1"/>
+            </a:effectRef>
+            <a:fontRef idx="minor">
+              <a:schemeClr val="tx1"/>
+            </a:fontRef>
+          </p:style>
+        </p:cxnSp>
+        <p:cxnSp>
+          <p:nvCxnSpPr>
+            <p:cNvPr id="9" name="Straight Connector 8">
+              <a:extLst>
+                <a:ext uri="{FF2B5EF4-FFF2-40B4-BE49-F238E27FC236}">
+                  <a16:creationId xmlns:a16="http://schemas.microsoft.com/office/drawing/2014/main" id="{4554647F-3C4E-410F-BD31-450B869B1FC2}"/>
+                </a:ext>
+              </a:extLst>
+            </p:cNvPr>
+            <p:cNvCxnSpPr>
+              <a:cxnSpLocks/>
+            </p:cNvCxnSpPr>
+            <p:nvPr/>
+          </p:nvCxnSpPr>
+          <p:spPr>
+            <a:xfrm>
+              <a:off x="722811" y="6479177"/>
+              <a:ext cx="3640183" cy="0"/>
+            </a:xfrm>
+            <a:prstGeom prst="line">
+              <a:avLst/>
+            </a:prstGeom>
+            <a:ln w="25400">
+              <a:solidFill>
+                <a:schemeClr val="bg1"/>
+              </a:solidFill>
+            </a:ln>
+          </p:spPr>
+          <p:style>
+            <a:lnRef idx="1">
+              <a:schemeClr val="accent1"/>
+            </a:lnRef>
+            <a:fillRef idx="0">
+              <a:schemeClr val="accent1"/>
+            </a:fillRef>
+            <a:effectRef idx="0">
+              <a:schemeClr val="accent1"/>
+            </a:effectRef>
+            <a:fontRef idx="minor">
+              <a:schemeClr val="tx1"/>
+            </a:fontRef>
+          </p:style>
+        </p:cxnSp>
+        <p:cxnSp>
+          <p:nvCxnSpPr>
+            <p:cNvPr id="10" name="Straight Arrow Connector 9">
+              <a:extLst>
+                <a:ext uri="{FF2B5EF4-FFF2-40B4-BE49-F238E27FC236}">
+                  <a16:creationId xmlns:a16="http://schemas.microsoft.com/office/drawing/2014/main" id="{880CC7A3-2D84-457C-B63E-BF0D68830012}"/>
+                </a:ext>
+              </a:extLst>
+            </p:cNvPr>
+            <p:cNvCxnSpPr/>
+            <p:nvPr/>
+          </p:nvCxnSpPr>
+          <p:spPr>
+            <a:xfrm>
+              <a:off x="1062446" y="4659086"/>
+              <a:ext cx="0" cy="1820091"/>
+            </a:xfrm>
+            <a:prstGeom prst="straightConnector1">
+              <a:avLst/>
+            </a:prstGeom>
+            <a:ln w="12700">
+              <a:solidFill>
+                <a:schemeClr val="bg1"/>
+              </a:solidFill>
+              <a:headEnd type="triangle"/>
+              <a:tailEnd type="triangle"/>
+            </a:ln>
+          </p:spPr>
+          <p:style>
+            <a:lnRef idx="1">
+              <a:schemeClr val="accent1"/>
+            </a:lnRef>
+            <a:fillRef idx="0">
+              <a:schemeClr val="accent1"/>
+            </a:fillRef>
+            <a:effectRef idx="0">
+              <a:schemeClr val="accent1"/>
+            </a:effectRef>
+            <a:fontRef idx="minor">
+              <a:schemeClr val="tx1"/>
+            </a:fontRef>
+          </p:style>
+        </p:cxnSp>
+        <p:cxnSp>
+          <p:nvCxnSpPr>
+            <p:cNvPr id="11" name="Straight Arrow Connector 10">
+              <a:extLst>
+                <a:ext uri="{FF2B5EF4-FFF2-40B4-BE49-F238E27FC236}">
+                  <a16:creationId xmlns:a16="http://schemas.microsoft.com/office/drawing/2014/main" id="{FEF24D1C-E94A-4D26-85DD-A6EC0FFD6548}"/>
+                </a:ext>
+              </a:extLst>
+            </p:cNvPr>
+            <p:cNvCxnSpPr>
+              <a:cxnSpLocks/>
+            </p:cNvCxnSpPr>
+            <p:nvPr/>
+          </p:nvCxnSpPr>
+          <p:spPr>
+            <a:xfrm>
+              <a:off x="1062446" y="3579223"/>
+              <a:ext cx="0" cy="1079863"/>
+            </a:xfrm>
+            <a:prstGeom prst="straightConnector1">
+              <a:avLst/>
+            </a:prstGeom>
+            <a:ln w="12700">
+              <a:solidFill>
+                <a:schemeClr val="bg1"/>
+              </a:solidFill>
+              <a:headEnd type="triangle"/>
+              <a:tailEnd type="triangle"/>
+            </a:ln>
+          </p:spPr>
+          <p:style>
+            <a:lnRef idx="1">
+              <a:schemeClr val="accent1"/>
+            </a:lnRef>
+            <a:fillRef idx="0">
+              <a:schemeClr val="accent1"/>
+            </a:fillRef>
+            <a:effectRef idx="0">
+              <a:schemeClr val="accent1"/>
+            </a:effectRef>
+            <a:fontRef idx="minor">
+              <a:schemeClr val="tx1"/>
+            </a:fontRef>
+          </p:style>
+        </p:cxnSp>
+        <p:cxnSp>
+          <p:nvCxnSpPr>
+            <p:cNvPr id="12" name="Straight Arrow Connector 11">
+              <a:extLst>
+                <a:ext uri="{FF2B5EF4-FFF2-40B4-BE49-F238E27FC236}">
+                  <a16:creationId xmlns:a16="http://schemas.microsoft.com/office/drawing/2014/main" id="{34BE1ED7-A173-4BE3-AF24-B047F12DCBA3}"/>
+                </a:ext>
+              </a:extLst>
+            </p:cNvPr>
+            <p:cNvCxnSpPr>
+              <a:cxnSpLocks/>
+            </p:cNvCxnSpPr>
+            <p:nvPr/>
+          </p:nvCxnSpPr>
+          <p:spPr>
+            <a:xfrm>
+              <a:off x="1062446" y="2656115"/>
+              <a:ext cx="0" cy="923108"/>
+            </a:xfrm>
+            <a:prstGeom prst="straightConnector1">
+              <a:avLst/>
+            </a:prstGeom>
+            <a:ln w="12700">
+              <a:solidFill>
+                <a:schemeClr val="bg1"/>
+              </a:solidFill>
+              <a:headEnd type="triangle"/>
+              <a:tailEnd type="triangle"/>
+            </a:ln>
+          </p:spPr>
+          <p:style>
+            <a:lnRef idx="1">
+              <a:schemeClr val="accent1"/>
+            </a:lnRef>
+            <a:fillRef idx="0">
+              <a:schemeClr val="accent1"/>
+            </a:fillRef>
+            <a:effectRef idx="0">
+              <a:schemeClr val="accent1"/>
+            </a:effectRef>
+            <a:fontRef idx="minor">
+              <a:schemeClr val="tx1"/>
+            </a:fontRef>
+          </p:style>
+        </p:cxnSp>
+        <p:cxnSp>
+          <p:nvCxnSpPr>
+            <p:cNvPr id="13" name="Straight Arrow Connector 12">
+              <a:extLst>
+                <a:ext uri="{FF2B5EF4-FFF2-40B4-BE49-F238E27FC236}">
+                  <a16:creationId xmlns:a16="http://schemas.microsoft.com/office/drawing/2014/main" id="{7A2EA275-DA21-4555-9605-7CC0A001B76A}"/>
+                </a:ext>
+              </a:extLst>
+            </p:cNvPr>
+            <p:cNvCxnSpPr>
+              <a:cxnSpLocks/>
+            </p:cNvCxnSpPr>
+            <p:nvPr/>
+          </p:nvCxnSpPr>
+          <p:spPr>
+            <a:xfrm>
+              <a:off x="1062446" y="1672046"/>
+              <a:ext cx="0" cy="984069"/>
+            </a:xfrm>
+            <a:prstGeom prst="straightConnector1">
+              <a:avLst/>
+            </a:prstGeom>
+            <a:ln w="12700">
+              <a:solidFill>
+                <a:schemeClr val="bg1"/>
+              </a:solidFill>
+              <a:headEnd type="triangle"/>
+              <a:tailEnd type="triangle"/>
+            </a:ln>
+          </p:spPr>
+          <p:style>
+            <a:lnRef idx="1">
+              <a:schemeClr val="accent1"/>
+            </a:lnRef>
+            <a:fillRef idx="0">
+              <a:schemeClr val="accent1"/>
+            </a:fillRef>
+            <a:effectRef idx="0">
+              <a:schemeClr val="accent1"/>
+            </a:effectRef>
+            <a:fontRef idx="minor">
+              <a:schemeClr val="tx1"/>
+            </a:fontRef>
+          </p:style>
+        </p:cxnSp>
+        <p:sp>
+          <p:nvSpPr>
+            <p:cNvPr id="14" name="TextBox 13">
+              <a:extLst>
+                <a:ext uri="{FF2B5EF4-FFF2-40B4-BE49-F238E27FC236}">
+                  <a16:creationId xmlns:a16="http://schemas.microsoft.com/office/drawing/2014/main" id="{AE663752-DDC3-4EC4-B016-B59E20B3CAD4}"/>
+                </a:ext>
+              </a:extLst>
+            </p:cNvPr>
+            <p:cNvSpPr txBox="1"/>
+            <p:nvPr/>
+          </p:nvSpPr>
+          <p:spPr>
+            <a:xfrm>
+              <a:off x="4286774" y="4428251"/>
+              <a:ext cx="2410553" cy="601875"/>
+            </a:xfrm>
+            <a:prstGeom prst="rect">
+              <a:avLst/>
+            </a:prstGeom>
+            <a:noFill/>
+          </p:spPr>
+          <p:txBody>
+            <a:bodyPr wrap="none" rtlCol="0">
+              <a:spAutoFit/>
+            </a:bodyPr>
+            <a:lstStyle/>
+            <a:p>
+              <a:r>
+                <a:rPr lang="en-US" sz="2400" dirty="0">
+                  <a:solidFill>
+                    <a:srgbClr val="FF0000"/>
+                  </a:solidFill>
+                </a:rPr>
+                <a:t>Basic Mass</a:t>
+              </a:r>
+            </a:p>
+          </p:txBody>
+        </p:sp>
+        <p:sp>
+          <p:nvSpPr>
+            <p:cNvPr id="15" name="TextBox 14">
+              <a:extLst>
+                <a:ext uri="{FF2B5EF4-FFF2-40B4-BE49-F238E27FC236}">
+                  <a16:creationId xmlns:a16="http://schemas.microsoft.com/office/drawing/2014/main" id="{11583D1F-A1E5-4268-A71A-45F9F856C948}"/>
+                </a:ext>
+              </a:extLst>
+            </p:cNvPr>
+            <p:cNvSpPr txBox="1"/>
+            <p:nvPr/>
+          </p:nvSpPr>
+          <p:spPr>
+            <a:xfrm>
+              <a:off x="1062446" y="3857544"/>
+              <a:ext cx="3712170" cy="523220"/>
+            </a:xfrm>
+            <a:prstGeom prst="rect">
+              <a:avLst/>
+            </a:prstGeom>
+            <a:noFill/>
+          </p:spPr>
+          <p:txBody>
+            <a:bodyPr wrap="none" rtlCol="0">
+              <a:spAutoFit/>
+            </a:bodyPr>
+            <a:lstStyle/>
+            <a:p>
+              <a:r>
+                <a:rPr lang="en-US" sz="2800" dirty="0">
+                  <a:solidFill>
+                    <a:schemeClr val="bg1"/>
+                  </a:solidFill>
+                </a:rPr>
+                <a:t>Mass Growth Allowance</a:t>
+              </a:r>
+            </a:p>
+          </p:txBody>
+        </p:sp>
+        <p:sp>
+          <p:nvSpPr>
+            <p:cNvPr id="16" name="TextBox 15">
+              <a:extLst>
+                <a:ext uri="{FF2B5EF4-FFF2-40B4-BE49-F238E27FC236}">
+                  <a16:creationId xmlns:a16="http://schemas.microsoft.com/office/drawing/2014/main" id="{390297EC-8BC7-435E-ABB2-3EBCE3FBD795}"/>
+                </a:ext>
+              </a:extLst>
+            </p:cNvPr>
+            <p:cNvSpPr txBox="1"/>
+            <p:nvPr/>
+          </p:nvSpPr>
+          <p:spPr>
+            <a:xfrm>
+              <a:off x="1062446" y="2864412"/>
+              <a:ext cx="2066463" cy="523220"/>
+            </a:xfrm>
+            <a:prstGeom prst="rect">
+              <a:avLst/>
+            </a:prstGeom>
+            <a:noFill/>
+          </p:spPr>
+          <p:txBody>
+            <a:bodyPr wrap="none" rtlCol="0">
+              <a:spAutoFit/>
+            </a:bodyPr>
+            <a:lstStyle/>
+            <a:p>
+              <a:r>
+                <a:rPr lang="en-US" sz="2800" dirty="0">
+                  <a:solidFill>
+                    <a:schemeClr val="bg1"/>
+                  </a:solidFill>
+                </a:rPr>
+                <a:t>Mass Margin</a:t>
+              </a:r>
+            </a:p>
+          </p:txBody>
+        </p:sp>
+        <p:sp>
+          <p:nvSpPr>
+            <p:cNvPr id="17" name="TextBox 16">
+              <a:extLst>
+                <a:ext uri="{FF2B5EF4-FFF2-40B4-BE49-F238E27FC236}">
+                  <a16:creationId xmlns:a16="http://schemas.microsoft.com/office/drawing/2014/main" id="{F6F6B66F-E9C2-457C-834D-50E37637D792}"/>
+                </a:ext>
+              </a:extLst>
+            </p:cNvPr>
+            <p:cNvSpPr txBox="1"/>
+            <p:nvPr/>
+          </p:nvSpPr>
+          <p:spPr>
+            <a:xfrm>
+              <a:off x="1062446" y="1879639"/>
+              <a:ext cx="3412129" cy="682124"/>
+            </a:xfrm>
+            <a:prstGeom prst="rect">
+              <a:avLst/>
+            </a:prstGeom>
+            <a:noFill/>
+          </p:spPr>
+          <p:txBody>
+            <a:bodyPr wrap="none" rtlCol="0">
+              <a:spAutoFit/>
+            </a:bodyPr>
+            <a:lstStyle/>
+            <a:p>
+              <a:r>
+                <a:rPr lang="en-US" sz="2800" dirty="0">
+                  <a:solidFill>
+                    <a:schemeClr val="bg1"/>
+                  </a:solidFill>
+                </a:rPr>
+                <a:t>Mass Reserve</a:t>
+              </a:r>
+            </a:p>
+          </p:txBody>
+        </p:sp>
+        <p:sp>
+          <p:nvSpPr>
+            <p:cNvPr id="18" name="TextBox 17">
+              <a:extLst>
+                <a:ext uri="{FF2B5EF4-FFF2-40B4-BE49-F238E27FC236}">
+                  <a16:creationId xmlns:a16="http://schemas.microsoft.com/office/drawing/2014/main" id="{26A53355-AA24-4885-86ED-DF822FC4544D}"/>
+                </a:ext>
+              </a:extLst>
+            </p:cNvPr>
+            <p:cNvSpPr txBox="1"/>
+            <p:nvPr/>
+          </p:nvSpPr>
+          <p:spPr>
+            <a:xfrm>
+              <a:off x="4287900" y="3348389"/>
+              <a:ext cx="2097690" cy="461665"/>
+            </a:xfrm>
+            <a:prstGeom prst="rect">
+              <a:avLst/>
+            </a:prstGeom>
+            <a:noFill/>
+          </p:spPr>
+          <p:txBody>
+            <a:bodyPr wrap="none" rtlCol="0">
+              <a:spAutoFit/>
+            </a:bodyPr>
+            <a:lstStyle/>
+            <a:p>
+              <a:r>
+                <a:rPr lang="en-US" sz="2400" dirty="0">
+                  <a:solidFill>
+                    <a:schemeClr val="bg1"/>
+                  </a:solidFill>
+                </a:rPr>
+                <a:t>Predicted Mass</a:t>
+              </a:r>
+            </a:p>
+          </p:txBody>
+        </p:sp>
+        <p:sp>
+          <p:nvSpPr>
+            <p:cNvPr id="19" name="TextBox 18">
+              <a:extLst>
+                <a:ext uri="{FF2B5EF4-FFF2-40B4-BE49-F238E27FC236}">
+                  <a16:creationId xmlns:a16="http://schemas.microsoft.com/office/drawing/2014/main" id="{50F1536B-1DAD-4ED4-BFBB-C04E0D5B8EF7}"/>
+                </a:ext>
+              </a:extLst>
+            </p:cNvPr>
+            <p:cNvSpPr txBox="1"/>
+            <p:nvPr/>
+          </p:nvSpPr>
+          <p:spPr>
+            <a:xfrm>
+              <a:off x="4316428" y="2425282"/>
+              <a:ext cx="3342137" cy="601875"/>
+            </a:xfrm>
+            <a:prstGeom prst="rect">
+              <a:avLst/>
+            </a:prstGeom>
+            <a:noFill/>
+          </p:spPr>
+          <p:txBody>
+            <a:bodyPr wrap="none" rtlCol="0">
+              <a:spAutoFit/>
+            </a:bodyPr>
+            <a:lstStyle/>
+            <a:p>
+              <a:r>
+                <a:rPr lang="en-US" sz="2400" dirty="0">
+                  <a:solidFill>
+                    <a:schemeClr val="bg1"/>
+                  </a:solidFill>
+                </a:rPr>
+                <a:t>Allowable Mass</a:t>
+              </a:r>
+            </a:p>
+          </p:txBody>
+        </p:sp>
+        <p:sp>
+          <p:nvSpPr>
+            <p:cNvPr id="20" name="TextBox 19">
+              <a:extLst>
+                <a:ext uri="{FF2B5EF4-FFF2-40B4-BE49-F238E27FC236}">
+                  <a16:creationId xmlns:a16="http://schemas.microsoft.com/office/drawing/2014/main" id="{438C7260-05D7-4A21-839A-2BB7A3EC235C}"/>
+                </a:ext>
+              </a:extLst>
+            </p:cNvPr>
+            <p:cNvSpPr txBox="1"/>
+            <p:nvPr/>
+          </p:nvSpPr>
+          <p:spPr>
+            <a:xfrm>
+              <a:off x="4289540" y="1447707"/>
+              <a:ext cx="2882520" cy="601875"/>
+            </a:xfrm>
+            <a:prstGeom prst="rect">
+              <a:avLst/>
+            </a:prstGeom>
+            <a:noFill/>
+          </p:spPr>
+          <p:txBody>
+            <a:bodyPr wrap="none" rtlCol="0">
+              <a:spAutoFit/>
+            </a:bodyPr>
+            <a:lstStyle/>
+            <a:p>
+              <a:r>
+                <a:rPr lang="en-US" sz="2400" dirty="0">
+                  <a:solidFill>
+                    <a:schemeClr val="bg1"/>
+                  </a:solidFill>
+                </a:rPr>
+                <a:t>Mission Limit</a:t>
+              </a:r>
+            </a:p>
+          </p:txBody>
+        </p:sp>
+        <p:sp>
+          <p:nvSpPr>
+            <p:cNvPr id="21" name="TextBox 20">
+              <a:extLst>
+                <a:ext uri="{FF2B5EF4-FFF2-40B4-BE49-F238E27FC236}">
+                  <a16:creationId xmlns:a16="http://schemas.microsoft.com/office/drawing/2014/main" id="{FE87E137-6CA1-49AA-9413-F651315D3064}"/>
+                </a:ext>
+              </a:extLst>
+            </p:cNvPr>
+            <p:cNvSpPr txBox="1"/>
+            <p:nvPr/>
+          </p:nvSpPr>
+          <p:spPr>
+            <a:xfrm>
+              <a:off x="4305318" y="6248344"/>
+              <a:ext cx="340158" cy="461665"/>
+            </a:xfrm>
+            <a:prstGeom prst="rect">
+              <a:avLst/>
+            </a:prstGeom>
+            <a:noFill/>
+          </p:spPr>
+          <p:txBody>
+            <a:bodyPr wrap="none" rtlCol="0">
+              <a:spAutoFit/>
+            </a:bodyPr>
+            <a:lstStyle/>
+            <a:p>
+              <a:r>
+                <a:rPr lang="en-US" sz="2400" dirty="0">
+                  <a:solidFill>
+                    <a:schemeClr val="bg1"/>
+                  </a:solidFill>
+                </a:rPr>
+                <a:t>0</a:t>
+              </a:r>
+            </a:p>
+          </p:txBody>
+        </p:sp>
+      </p:grpSp>
+    </p:spTree>
+    <p:extLst>
+      <p:ext uri="{BB962C8B-B14F-4D97-AF65-F5344CB8AC3E}">
+        <p14:creationId xmlns:p14="http://schemas.microsoft.com/office/powerpoint/2010/main" val="1489339135"/>
+      </p:ext>
+    </p:extLst>
+  </p:cSld>
+  <p:clrMapOvr>
+    <a:masterClrMapping/>
+  </p:clrMapOvr>
+  <p:timing>
+    <p:tnLst>
+      <p:par>
+        <p:cTn id="1" dur="indefinite" restart="never" nodeType="tmRoot"/>
+      </p:par>
+    </p:tnLst>
+  </p:timing>
+</p:sld>
+</file>
+
+<file path=ppt/slides/slide12.xml><?xml version="1.0" encoding="utf-8"?>
+<p:sld xmlns:a="http://schemas.openxmlformats.org/drawingml/2006/main" xmlns:r="http://schemas.openxmlformats.org/officeDocument/2006/relationships" xmlns:p="http://schemas.openxmlformats.org/presentationml/2006/main">
+  <p:cSld>
+    <p:spTree>
+      <p:nvGrpSpPr>
+        <p:cNvPr id="1" name=""/>
+        <p:cNvGrpSpPr/>
+        <p:nvPr/>
+      </p:nvGrpSpPr>
+      <p:grpSpPr>
+        <a:xfrm>
+          <a:off x="0" y="0"/>
+          <a:ext cx="0" cy="0"/>
+          <a:chOff x="0" y="0"/>
+          <a:chExt cx="0" cy="0"/>
+        </a:xfrm>
+      </p:grpSpPr>
+      <p:sp>
+        <p:nvSpPr>
+          <p:cNvPr id="2" name="Title 1">
+            <a:extLst>
+              <a:ext uri="{FF2B5EF4-FFF2-40B4-BE49-F238E27FC236}">
+                <a16:creationId xmlns:a16="http://schemas.microsoft.com/office/drawing/2014/main" id="{089FE6BE-A025-4A85-B67C-D1AFB1B45CA3}"/>
+              </a:ext>
+            </a:extLst>
+          </p:cNvPr>
+          <p:cNvSpPr>
+            <a:spLocks noGrp="1"/>
+          </p:cNvSpPr>
+          <p:nvPr>
+            <p:ph type="title"/>
+          </p:nvPr>
+        </p:nvSpPr>
+        <p:spPr/>
+        <p:txBody>
+          <a:bodyPr/>
+          <a:lstStyle/>
+          <a:p>
+            <a:r>
+              <a:rPr lang="en-US" dirty="0"/>
               <a:t>Mass Growth Allowance</a:t>
             </a:r>
           </a:p>
@@ -4922,10 +5800,17 @@
   <p:clrMapOvr>
     <a:masterClrMapping/>
   </p:clrMapOvr>
+  <p:timing>
+    <p:tnLst>
+      <p:par>
+        <p:cTn id="1" dur="indefinite" restart="never" nodeType="tmRoot"/>
+      </p:par>
+    </p:tnLst>
+  </p:timing>
 </p:sld>
 </file>
 
-<file path=ppt/slides/slide12.xml><?xml version="1.0" encoding="utf-8"?>
+<file path=ppt/slides/slide13.xml><?xml version="1.0" encoding="utf-8"?>
 <p:sld xmlns:a="http://schemas.openxmlformats.org/drawingml/2006/main" xmlns:r="http://schemas.openxmlformats.org/officeDocument/2006/relationships" xmlns:p="http://schemas.openxmlformats.org/presentationml/2006/main">
   <p:cSld>
     <p:spTree>
@@ -5778,10 +6663,17 @@
   <p:clrMapOvr>
     <a:masterClrMapping/>
   </p:clrMapOvr>
+  <p:timing>
+    <p:tnLst>
+      <p:par>
+        <p:cTn id="1" dur="indefinite" restart="never" nodeType="tmRoot"/>
+      </p:par>
+    </p:tnLst>
+  </p:timing>
 </p:sld>
 </file>
 
-<file path=ppt/slides/slide13.xml><?xml version="1.0" encoding="utf-8"?>
+<file path=ppt/slides/slide14.xml><?xml version="1.0" encoding="utf-8"?>
 <p:sld xmlns:a="http://schemas.openxmlformats.org/drawingml/2006/main" xmlns:r="http://schemas.openxmlformats.org/officeDocument/2006/relationships" xmlns:p="http://schemas.openxmlformats.org/presentationml/2006/main">
   <p:cSld>
     <p:spTree>
@@ -6623,10 +7515,17 @@
   <p:clrMapOvr>
     <a:masterClrMapping/>
   </p:clrMapOvr>
+  <p:timing>
+    <p:tnLst>
+      <p:par>
+        <p:cTn id="1" dur="indefinite" restart="never" nodeType="tmRoot"/>
+      </p:par>
+    </p:tnLst>
+  </p:timing>
 </p:sld>
 </file>
 
-<file path=ppt/slides/slide14.xml><?xml version="1.0" encoding="utf-8"?>
+<file path=ppt/slides/slide15.xml><?xml version="1.0" encoding="utf-8"?>
 <p:sld xmlns:a="http://schemas.openxmlformats.org/drawingml/2006/main" xmlns:r="http://schemas.openxmlformats.org/officeDocument/2006/relationships" xmlns:p="http://schemas.openxmlformats.org/presentationml/2006/main">
   <p:cSld>
     <p:spTree>
@@ -7585,10 +8484,17 @@
   <p:clrMapOvr>
     <a:masterClrMapping/>
   </p:clrMapOvr>
+  <p:timing>
+    <p:tnLst>
+      <p:par>
+        <p:cTn id="1" dur="indefinite" restart="never" nodeType="tmRoot"/>
+      </p:par>
+    </p:tnLst>
+  </p:timing>
 </p:sld>
 </file>
 
-<file path=ppt/slides/slide15.xml><?xml version="1.0" encoding="utf-8"?>
+<file path=ppt/slides/slide16.xml><?xml version="1.0" encoding="utf-8"?>
 <p:sld xmlns:a="http://schemas.openxmlformats.org/drawingml/2006/main" xmlns:r="http://schemas.openxmlformats.org/officeDocument/2006/relationships" xmlns:p="http://schemas.openxmlformats.org/presentationml/2006/main">
   <p:cSld>
     <p:spTree>
@@ -7713,10 +8619,17 @@
   <p:clrMapOvr>
     <a:masterClrMapping/>
   </p:clrMapOvr>
+  <p:timing>
+    <p:tnLst>
+      <p:par>
+        <p:cTn id="1" dur="indefinite" restart="never" nodeType="tmRoot"/>
+      </p:par>
+    </p:tnLst>
+  </p:timing>
 </p:sld>
 </file>
 
-<file path=ppt/slides/slide16.xml><?xml version="1.0" encoding="utf-8"?>
+<file path=ppt/slides/slide17.xml><?xml version="1.0" encoding="utf-8"?>
 <p:sld xmlns:a="http://schemas.openxmlformats.org/drawingml/2006/main" xmlns:r="http://schemas.openxmlformats.org/officeDocument/2006/relationships" xmlns:p="http://schemas.openxmlformats.org/presentationml/2006/main">
   <p:cSld>
     <p:spTree>
@@ -7796,10 +8709,17 @@
   <p:clrMapOvr>
     <a:masterClrMapping/>
   </p:clrMapOvr>
+  <p:timing>
+    <p:tnLst>
+      <p:par>
+        <p:cTn id="1" dur="indefinite" restart="never" nodeType="tmRoot"/>
+      </p:par>
+    </p:tnLst>
+  </p:timing>
 </p:sld>
 </file>
 
-<file path=ppt/slides/slide17.xml><?xml version="1.0" encoding="utf-8"?>
+<file path=ppt/slides/slide18.xml><?xml version="1.0" encoding="utf-8"?>
 <p:sld xmlns:a="http://schemas.openxmlformats.org/drawingml/2006/main" xmlns:r="http://schemas.openxmlformats.org/officeDocument/2006/relationships" xmlns:p="http://schemas.openxmlformats.org/presentationml/2006/main">
   <p:cSld>
     <p:spTree>
@@ -7885,6 +8805,13 @@
   <p:clrMapOvr>
     <a:masterClrMapping/>
   </p:clrMapOvr>
+  <p:timing>
+    <p:tnLst>
+      <p:par>
+        <p:cTn id="1" dur="indefinite" restart="never" nodeType="tmRoot"/>
+      </p:par>
+    </p:tnLst>
+  </p:timing>
 </p:sld>
 </file>
 
@@ -7998,13 +8925,9 @@
               <a:t>That is, don’t design for exactly 120 </a:t>
             </a:r>
             <a:r>
-              <a:rPr lang="en-US" dirty="0" err="1"/>
+              <a:rPr lang="en-US" dirty="0" err="1" smtClean="0"/>
               <a:t>lbm</a:t>
             </a:r>
-            <a:endParaRPr lang="en-US" dirty="0"/>
-          </a:p>
-          <a:p>
-            <a:pPr lvl="1"/>
             <a:endParaRPr lang="en-US" dirty="0"/>
           </a:p>
           <a:p>
@@ -8023,6 +8946,116 @@
   <p:clrMapOvr>
     <a:masterClrMapping/>
   </p:clrMapOvr>
+  <p:timing>
+    <p:tnLst>
+      <p:par>
+        <p:cTn id="1" dur="indefinite" restart="never" nodeType="tmRoot">
+          <p:childTnLst>
+            <p:seq concurrent="1" nextAc="seek">
+              <p:cTn id="2" dur="indefinite" nodeType="mainSeq">
+                <p:childTnLst>
+                  <p:par>
+                    <p:cTn id="3" fill="hold">
+                      <p:stCondLst>
+                        <p:cond delay="indefinite"/>
+                      </p:stCondLst>
+                      <p:childTnLst>
+                        <p:par>
+                          <p:cTn id="4" fill="hold">
+                            <p:stCondLst>
+                              <p:cond delay="0"/>
+                            </p:stCondLst>
+                            <p:childTnLst>
+                              <p:par>
+                                <p:cTn id="5" presetID="1" presetClass="entr" presetSubtype="0" fill="hold" nodeType="clickEffect">
+                                  <p:stCondLst>
+                                    <p:cond delay="0"/>
+                                  </p:stCondLst>
+                                  <p:childTnLst>
+                                    <p:set>
+                                      <p:cBhvr>
+                                        <p:cTn id="6" dur="1" fill="hold">
+                                          <p:stCondLst>
+                                            <p:cond delay="0"/>
+                                          </p:stCondLst>
+                                        </p:cTn>
+                                        <p:tgtEl>
+                                          <p:spTgt spid="3">
+                                            <p:txEl>
+                                              <p:pRg st="4" end="4"/>
+                                            </p:txEl>
+                                          </p:spTgt>
+                                        </p:tgtEl>
+                                        <p:attrNameLst>
+                                          <p:attrName>style.visibility</p:attrName>
+                                        </p:attrNameLst>
+                                      </p:cBhvr>
+                                      <p:to>
+                                        <p:strVal val="visible"/>
+                                      </p:to>
+                                    </p:set>
+                                  </p:childTnLst>
+                                </p:cTn>
+                              </p:par>
+                              <p:par>
+                                <p:cTn id="7" presetID="1" presetClass="entr" presetSubtype="0" fill="hold" nodeType="withEffect">
+                                  <p:stCondLst>
+                                    <p:cond delay="0"/>
+                                  </p:stCondLst>
+                                  <p:childTnLst>
+                                    <p:set>
+                                      <p:cBhvr>
+                                        <p:cTn id="8" dur="1" fill="hold">
+                                          <p:stCondLst>
+                                            <p:cond delay="0"/>
+                                          </p:stCondLst>
+                                        </p:cTn>
+                                        <p:tgtEl>
+                                          <p:spTgt spid="3">
+                                            <p:txEl>
+                                              <p:pRg st="5" end="5"/>
+                                            </p:txEl>
+                                          </p:spTgt>
+                                        </p:tgtEl>
+                                        <p:attrNameLst>
+                                          <p:attrName>style.visibility</p:attrName>
+                                        </p:attrNameLst>
+                                      </p:cBhvr>
+                                      <p:to>
+                                        <p:strVal val="visible"/>
+                                      </p:to>
+                                    </p:set>
+                                  </p:childTnLst>
+                                </p:cTn>
+                              </p:par>
+                            </p:childTnLst>
+                          </p:cTn>
+                        </p:par>
+                      </p:childTnLst>
+                    </p:cTn>
+                  </p:par>
+                </p:childTnLst>
+              </p:cTn>
+              <p:prevCondLst>
+                <p:cond evt="onPrev" delay="0">
+                  <p:tgtEl>
+                    <p:sldTgt/>
+                  </p:tgtEl>
+                </p:cond>
+              </p:prevCondLst>
+              <p:nextCondLst>
+                <p:cond evt="onNext" delay="0">
+                  <p:tgtEl>
+                    <p:sldTgt/>
+                  </p:tgtEl>
+                </p:cond>
+              </p:nextCondLst>
+            </p:seq>
+          </p:childTnLst>
+        </p:cTn>
+      </p:par>
+    </p:tnLst>
+  </p:timing>
 </p:sld>
 </file>
 
@@ -8227,6 +9260,13 @@
   <p:clrMapOvr>
     <a:masterClrMapping/>
   </p:clrMapOvr>
+  <p:timing>
+    <p:tnLst>
+      <p:par>
+        <p:cTn id="1" dur="indefinite" restart="never" nodeType="tmRoot"/>
+      </p:par>
+    </p:tnLst>
+  </p:timing>
 </p:sld>
 </file>
 
@@ -8412,10 +9452,579 @@
   <p:clrMapOvr>
     <a:masterClrMapping/>
   </p:clrMapOvr>
+  <p:timing>
+    <p:tnLst>
+      <p:par>
+        <p:cTn id="1" dur="indefinite" restart="never" nodeType="tmRoot">
+          <p:childTnLst>
+            <p:seq concurrent="1" nextAc="seek">
+              <p:cTn id="2" dur="indefinite" nodeType="mainSeq">
+                <p:childTnLst>
+                  <p:par>
+                    <p:cTn id="3" fill="hold">
+                      <p:stCondLst>
+                        <p:cond delay="indefinite"/>
+                      </p:stCondLst>
+                      <p:childTnLst>
+                        <p:par>
+                          <p:cTn id="4" fill="hold">
+                            <p:stCondLst>
+                              <p:cond delay="0"/>
+                            </p:stCondLst>
+                            <p:childTnLst>
+                              <p:par>
+                                <p:cTn id="5" presetID="1" presetClass="entr" presetSubtype="0" fill="hold" nodeType="clickEffect">
+                                  <p:stCondLst>
+                                    <p:cond delay="0"/>
+                                  </p:stCondLst>
+                                  <p:childTnLst>
+                                    <p:set>
+                                      <p:cBhvr>
+                                        <p:cTn id="6" dur="1" fill="hold">
+                                          <p:stCondLst>
+                                            <p:cond delay="0"/>
+                                          </p:stCondLst>
+                                        </p:cTn>
+                                        <p:tgtEl>
+                                          <p:spTgt spid="3">
+                                            <p:txEl>
+                                              <p:pRg st="1" end="1"/>
+                                            </p:txEl>
+                                          </p:spTgt>
+                                        </p:tgtEl>
+                                        <p:attrNameLst>
+                                          <p:attrName>style.visibility</p:attrName>
+                                        </p:attrNameLst>
+                                      </p:cBhvr>
+                                      <p:to>
+                                        <p:strVal val="visible"/>
+                                      </p:to>
+                                    </p:set>
+                                  </p:childTnLst>
+                                </p:cTn>
+                              </p:par>
+                            </p:childTnLst>
+                          </p:cTn>
+                        </p:par>
+                      </p:childTnLst>
+                    </p:cTn>
+                  </p:par>
+                  <p:par>
+                    <p:cTn id="7" fill="hold">
+                      <p:stCondLst>
+                        <p:cond delay="indefinite"/>
+                      </p:stCondLst>
+                      <p:childTnLst>
+                        <p:par>
+                          <p:cTn id="8" fill="hold">
+                            <p:stCondLst>
+                              <p:cond delay="0"/>
+                            </p:stCondLst>
+                            <p:childTnLst>
+                              <p:par>
+                                <p:cTn id="9" presetID="1" presetClass="entr" presetSubtype="0" fill="hold" nodeType="clickEffect">
+                                  <p:stCondLst>
+                                    <p:cond delay="0"/>
+                                  </p:stCondLst>
+                                  <p:childTnLst>
+                                    <p:set>
+                                      <p:cBhvr>
+                                        <p:cTn id="10" dur="1" fill="hold">
+                                          <p:stCondLst>
+                                            <p:cond delay="0"/>
+                                          </p:stCondLst>
+                                        </p:cTn>
+                                        <p:tgtEl>
+                                          <p:spTgt spid="3">
+                                            <p:txEl>
+                                              <p:pRg st="2" end="2"/>
+                                            </p:txEl>
+                                          </p:spTgt>
+                                        </p:tgtEl>
+                                        <p:attrNameLst>
+                                          <p:attrName>style.visibility</p:attrName>
+                                        </p:attrNameLst>
+                                      </p:cBhvr>
+                                      <p:to>
+                                        <p:strVal val="visible"/>
+                                      </p:to>
+                                    </p:set>
+                                  </p:childTnLst>
+                                </p:cTn>
+                              </p:par>
+                            </p:childTnLst>
+                          </p:cTn>
+                        </p:par>
+                      </p:childTnLst>
+                    </p:cTn>
+                  </p:par>
+                  <p:par>
+                    <p:cTn id="11" fill="hold">
+                      <p:stCondLst>
+                        <p:cond delay="indefinite"/>
+                      </p:stCondLst>
+                      <p:childTnLst>
+                        <p:par>
+                          <p:cTn id="12" fill="hold">
+                            <p:stCondLst>
+                              <p:cond delay="0"/>
+                            </p:stCondLst>
+                            <p:childTnLst>
+                              <p:par>
+                                <p:cTn id="13" presetID="1" presetClass="entr" presetSubtype="0" fill="hold" nodeType="clickEffect">
+                                  <p:stCondLst>
+                                    <p:cond delay="0"/>
+                                  </p:stCondLst>
+                                  <p:childTnLst>
+                                    <p:set>
+                                      <p:cBhvr>
+                                        <p:cTn id="14" dur="1" fill="hold">
+                                          <p:stCondLst>
+                                            <p:cond delay="0"/>
+                                          </p:stCondLst>
+                                        </p:cTn>
+                                        <p:tgtEl>
+                                          <p:spTgt spid="3">
+                                            <p:txEl>
+                                              <p:pRg st="3" end="3"/>
+                                            </p:txEl>
+                                          </p:spTgt>
+                                        </p:tgtEl>
+                                        <p:attrNameLst>
+                                          <p:attrName>style.visibility</p:attrName>
+                                        </p:attrNameLst>
+                                      </p:cBhvr>
+                                      <p:to>
+                                        <p:strVal val="visible"/>
+                                      </p:to>
+                                    </p:set>
+                                  </p:childTnLst>
+                                </p:cTn>
+                              </p:par>
+                            </p:childTnLst>
+                          </p:cTn>
+                        </p:par>
+                      </p:childTnLst>
+                    </p:cTn>
+                  </p:par>
+                  <p:par>
+                    <p:cTn id="15" fill="hold">
+                      <p:stCondLst>
+                        <p:cond delay="indefinite"/>
+                      </p:stCondLst>
+                      <p:childTnLst>
+                        <p:par>
+                          <p:cTn id="16" fill="hold">
+                            <p:stCondLst>
+                              <p:cond delay="0"/>
+                            </p:stCondLst>
+                            <p:childTnLst>
+                              <p:par>
+                                <p:cTn id="17" presetID="1" presetClass="entr" presetSubtype="0" fill="hold" nodeType="clickEffect">
+                                  <p:stCondLst>
+                                    <p:cond delay="0"/>
+                                  </p:stCondLst>
+                                  <p:childTnLst>
+                                    <p:set>
+                                      <p:cBhvr>
+                                        <p:cTn id="18" dur="1" fill="hold">
+                                          <p:stCondLst>
+                                            <p:cond delay="0"/>
+                                          </p:stCondLst>
+                                        </p:cTn>
+                                        <p:tgtEl>
+                                          <p:spTgt spid="3">
+                                            <p:txEl>
+                                              <p:pRg st="4" end="4"/>
+                                            </p:txEl>
+                                          </p:spTgt>
+                                        </p:tgtEl>
+                                        <p:attrNameLst>
+                                          <p:attrName>style.visibility</p:attrName>
+                                        </p:attrNameLst>
+                                      </p:cBhvr>
+                                      <p:to>
+                                        <p:strVal val="visible"/>
+                                      </p:to>
+                                    </p:set>
+                                  </p:childTnLst>
+                                </p:cTn>
+                              </p:par>
+                            </p:childTnLst>
+                          </p:cTn>
+                        </p:par>
+                      </p:childTnLst>
+                    </p:cTn>
+                  </p:par>
+                  <p:par>
+                    <p:cTn id="19" fill="hold">
+                      <p:stCondLst>
+                        <p:cond delay="indefinite"/>
+                      </p:stCondLst>
+                      <p:childTnLst>
+                        <p:par>
+                          <p:cTn id="20" fill="hold">
+                            <p:stCondLst>
+                              <p:cond delay="0"/>
+                            </p:stCondLst>
+                            <p:childTnLst>
+                              <p:par>
+                                <p:cTn id="21" presetID="1" presetClass="entr" presetSubtype="0" fill="hold" nodeType="clickEffect">
+                                  <p:stCondLst>
+                                    <p:cond delay="0"/>
+                                  </p:stCondLst>
+                                  <p:childTnLst>
+                                    <p:set>
+                                      <p:cBhvr>
+                                        <p:cTn id="22" dur="1" fill="hold">
+                                          <p:stCondLst>
+                                            <p:cond delay="0"/>
+                                          </p:stCondLst>
+                                        </p:cTn>
+                                        <p:tgtEl>
+                                          <p:spTgt spid="3">
+                                            <p:txEl>
+                                              <p:pRg st="5" end="5"/>
+                                            </p:txEl>
+                                          </p:spTgt>
+                                        </p:tgtEl>
+                                        <p:attrNameLst>
+                                          <p:attrName>style.visibility</p:attrName>
+                                        </p:attrNameLst>
+                                      </p:cBhvr>
+                                      <p:to>
+                                        <p:strVal val="visible"/>
+                                      </p:to>
+                                    </p:set>
+                                  </p:childTnLst>
+                                </p:cTn>
+                              </p:par>
+                            </p:childTnLst>
+                          </p:cTn>
+                        </p:par>
+                      </p:childTnLst>
+                    </p:cTn>
+                  </p:par>
+                  <p:par>
+                    <p:cTn id="23" fill="hold">
+                      <p:stCondLst>
+                        <p:cond delay="indefinite"/>
+                      </p:stCondLst>
+                      <p:childTnLst>
+                        <p:par>
+                          <p:cTn id="24" fill="hold">
+                            <p:stCondLst>
+                              <p:cond delay="0"/>
+                            </p:stCondLst>
+                            <p:childTnLst>
+                              <p:par>
+                                <p:cTn id="25" presetID="1" presetClass="entr" presetSubtype="0" fill="hold" nodeType="clickEffect">
+                                  <p:stCondLst>
+                                    <p:cond delay="0"/>
+                                  </p:stCondLst>
+                                  <p:childTnLst>
+                                    <p:set>
+                                      <p:cBhvr>
+                                        <p:cTn id="26" dur="1" fill="hold">
+                                          <p:stCondLst>
+                                            <p:cond delay="0"/>
+                                          </p:stCondLst>
+                                        </p:cTn>
+                                        <p:tgtEl>
+                                          <p:spTgt spid="3">
+                                            <p:txEl>
+                                              <p:pRg st="6" end="6"/>
+                                            </p:txEl>
+                                          </p:spTgt>
+                                        </p:tgtEl>
+                                        <p:attrNameLst>
+                                          <p:attrName>style.visibility</p:attrName>
+                                        </p:attrNameLst>
+                                      </p:cBhvr>
+                                      <p:to>
+                                        <p:strVal val="visible"/>
+                                      </p:to>
+                                    </p:set>
+                                  </p:childTnLst>
+                                </p:cTn>
+                              </p:par>
+                            </p:childTnLst>
+                          </p:cTn>
+                        </p:par>
+                      </p:childTnLst>
+                    </p:cTn>
+                  </p:par>
+                  <p:par>
+                    <p:cTn id="27" fill="hold">
+                      <p:stCondLst>
+                        <p:cond delay="indefinite"/>
+                      </p:stCondLst>
+                      <p:childTnLst>
+                        <p:par>
+                          <p:cTn id="28" fill="hold">
+                            <p:stCondLst>
+                              <p:cond delay="0"/>
+                            </p:stCondLst>
+                            <p:childTnLst>
+                              <p:par>
+                                <p:cTn id="29" presetID="1" presetClass="entr" presetSubtype="0" fill="hold" nodeType="clickEffect">
+                                  <p:stCondLst>
+                                    <p:cond delay="0"/>
+                                  </p:stCondLst>
+                                  <p:childTnLst>
+                                    <p:set>
+                                      <p:cBhvr>
+                                        <p:cTn id="30" dur="1" fill="hold">
+                                          <p:stCondLst>
+                                            <p:cond delay="0"/>
+                                          </p:stCondLst>
+                                        </p:cTn>
+                                        <p:tgtEl>
+                                          <p:spTgt spid="3">
+                                            <p:txEl>
+                                              <p:pRg st="7" end="7"/>
+                                            </p:txEl>
+                                          </p:spTgt>
+                                        </p:tgtEl>
+                                        <p:attrNameLst>
+                                          <p:attrName>style.visibility</p:attrName>
+                                        </p:attrNameLst>
+                                      </p:cBhvr>
+                                      <p:to>
+                                        <p:strVal val="visible"/>
+                                      </p:to>
+                                    </p:set>
+                                  </p:childTnLst>
+                                </p:cTn>
+                              </p:par>
+                            </p:childTnLst>
+                          </p:cTn>
+                        </p:par>
+                      </p:childTnLst>
+                    </p:cTn>
+                  </p:par>
+                  <p:par>
+                    <p:cTn id="31" fill="hold">
+                      <p:stCondLst>
+                        <p:cond delay="indefinite"/>
+                      </p:stCondLst>
+                      <p:childTnLst>
+                        <p:par>
+                          <p:cTn id="32" fill="hold">
+                            <p:stCondLst>
+                              <p:cond delay="0"/>
+                            </p:stCondLst>
+                            <p:childTnLst>
+                              <p:par>
+                                <p:cTn id="33" presetID="1" presetClass="entr" presetSubtype="0" fill="hold" nodeType="clickEffect">
+                                  <p:stCondLst>
+                                    <p:cond delay="0"/>
+                                  </p:stCondLst>
+                                  <p:childTnLst>
+                                    <p:set>
+                                      <p:cBhvr>
+                                        <p:cTn id="34" dur="1" fill="hold">
+                                          <p:stCondLst>
+                                            <p:cond delay="0"/>
+                                          </p:stCondLst>
+                                        </p:cTn>
+                                        <p:tgtEl>
+                                          <p:spTgt spid="3">
+                                            <p:txEl>
+                                              <p:pRg st="8" end="8"/>
+                                            </p:txEl>
+                                          </p:spTgt>
+                                        </p:tgtEl>
+                                        <p:attrNameLst>
+                                          <p:attrName>style.visibility</p:attrName>
+                                        </p:attrNameLst>
+                                      </p:cBhvr>
+                                      <p:to>
+                                        <p:strVal val="visible"/>
+                                      </p:to>
+                                    </p:set>
+                                  </p:childTnLst>
+                                </p:cTn>
+                              </p:par>
+                              <p:par>
+                                <p:cTn id="35" presetID="1" presetClass="entr" presetSubtype="0" fill="hold" nodeType="withEffect">
+                                  <p:stCondLst>
+                                    <p:cond delay="0"/>
+                                  </p:stCondLst>
+                                  <p:childTnLst>
+                                    <p:set>
+                                      <p:cBhvr>
+                                        <p:cTn id="36" dur="1" fill="hold">
+                                          <p:stCondLst>
+                                            <p:cond delay="0"/>
+                                          </p:stCondLst>
+                                        </p:cTn>
+                                        <p:tgtEl>
+                                          <p:spTgt spid="3">
+                                            <p:txEl>
+                                              <p:pRg st="9" end="9"/>
+                                            </p:txEl>
+                                          </p:spTgt>
+                                        </p:tgtEl>
+                                        <p:attrNameLst>
+                                          <p:attrName>style.visibility</p:attrName>
+                                        </p:attrNameLst>
+                                      </p:cBhvr>
+                                      <p:to>
+                                        <p:strVal val="visible"/>
+                                      </p:to>
+                                    </p:set>
+                                  </p:childTnLst>
+                                </p:cTn>
+                              </p:par>
+                            </p:childTnLst>
+                          </p:cTn>
+                        </p:par>
+                      </p:childTnLst>
+                    </p:cTn>
+                  </p:par>
+                </p:childTnLst>
+              </p:cTn>
+              <p:prevCondLst>
+                <p:cond evt="onPrev" delay="0">
+                  <p:tgtEl>
+                    <p:sldTgt/>
+                  </p:tgtEl>
+                </p:cond>
+              </p:prevCondLst>
+              <p:nextCondLst>
+                <p:cond evt="onNext" delay="0">
+                  <p:tgtEl>
+                    <p:sldTgt/>
+                  </p:tgtEl>
+                </p:cond>
+              </p:nextCondLst>
+            </p:seq>
+          </p:childTnLst>
+        </p:cTn>
+      </p:par>
+    </p:tnLst>
+  </p:timing>
 </p:sld>
 </file>
 
 <file path=ppt/slides/slide5.xml><?xml version="1.0" encoding="utf-8"?>
+<p:sld xmlns:a="http://schemas.openxmlformats.org/drawingml/2006/main" xmlns:r="http://schemas.openxmlformats.org/officeDocument/2006/relationships" xmlns:p="http://schemas.openxmlformats.org/presentationml/2006/main">
+  <p:cSld>
+    <p:spTree>
+      <p:nvGrpSpPr>
+        <p:cNvPr id="1" name=""/>
+        <p:cNvGrpSpPr/>
+        <p:nvPr/>
+      </p:nvGrpSpPr>
+      <p:grpSpPr>
+        <a:xfrm>
+          <a:off x="0" y="0"/>
+          <a:ext cx="0" cy="0"/>
+          <a:chOff x="0" y="0"/>
+          <a:chExt cx="0" cy="0"/>
+        </a:xfrm>
+      </p:grpSpPr>
+      <p:sp>
+        <p:nvSpPr>
+          <p:cNvPr id="2" name="Title 1">
+            <a:extLst>
+              <a:ext uri="{FF2B5EF4-FFF2-40B4-BE49-F238E27FC236}">
+                <a16:creationId xmlns:a16="http://schemas.microsoft.com/office/drawing/2014/main" id="{5764AD95-2345-43E0-B570-725E3A6E8E7A}"/>
+              </a:ext>
+            </a:extLst>
+          </p:cNvPr>
+          <p:cNvSpPr>
+            <a:spLocks noGrp="1"/>
+          </p:cNvSpPr>
+          <p:nvPr>
+            <p:ph type="title"/>
+          </p:nvPr>
+        </p:nvSpPr>
+        <p:spPr/>
+        <p:txBody>
+          <a:bodyPr/>
+          <a:lstStyle/>
+          <a:p>
+            <a:r>
+              <a:rPr lang="en-US" dirty="0"/>
+              <a:t>The Problem</a:t>
+            </a:r>
+          </a:p>
+        </p:txBody>
+      </p:sp>
+      <p:sp>
+        <p:nvSpPr>
+          <p:cNvPr id="3" name="Content Placeholder 2">
+            <a:extLst>
+              <a:ext uri="{FF2B5EF4-FFF2-40B4-BE49-F238E27FC236}">
+                <a16:creationId xmlns:a16="http://schemas.microsoft.com/office/drawing/2014/main" id="{C9F18B4D-E13F-40D8-80F3-498A02E4467E}"/>
+              </a:ext>
+            </a:extLst>
+          </p:cNvPr>
+          <p:cNvSpPr>
+            <a:spLocks noGrp="1"/>
+          </p:cNvSpPr>
+          <p:nvPr>
+            <p:ph idx="1"/>
+          </p:nvPr>
+        </p:nvSpPr>
+        <p:spPr/>
+        <p:txBody>
+          <a:bodyPr>
+            <a:normAutofit/>
+          </a:bodyPr>
+          <a:lstStyle/>
+          <a:p>
+            <a:r>
+              <a:rPr lang="en-US" dirty="0" smtClean="0"/>
+              <a:t>There’s a military joke with a similar theme:</a:t>
+            </a:r>
+          </a:p>
+          <a:p>
+            <a:endParaRPr lang="en-US" dirty="0" smtClean="0"/>
+          </a:p>
+          <a:p>
+            <a:pPr marL="0" indent="0">
+              <a:buNone/>
+            </a:pPr>
+            <a:r>
+              <a:rPr lang="en-US" dirty="0" smtClean="0"/>
+              <a:t>“The </a:t>
+            </a:r>
+            <a:r>
+              <a:rPr lang="en-US" dirty="0"/>
+              <a:t>captain wants everyone to meet at 0600, so the master sergeant wants folks to arrive at 0545, and when it finally hits the corporal people are told to show up at midnight</a:t>
+            </a:r>
+            <a:r>
+              <a:rPr lang="en-US" dirty="0" smtClean="0"/>
+              <a:t>.”</a:t>
+            </a:r>
+            <a:endParaRPr lang="en-US" dirty="0"/>
+          </a:p>
+        </p:txBody>
+      </p:sp>
+    </p:spTree>
+    <p:extLst>
+      <p:ext uri="{BB962C8B-B14F-4D97-AF65-F5344CB8AC3E}">
+        <p14:creationId xmlns:p14="http://schemas.microsoft.com/office/powerpoint/2010/main" val="3753976208"/>
+      </p:ext>
+    </p:extLst>
+  </p:cSld>
+  <p:clrMapOvr>
+    <a:masterClrMapping/>
+  </p:clrMapOvr>
+  <p:timing>
+    <p:tnLst>
+      <p:par>
+        <p:cTn id="1" dur="indefinite" restart="never" nodeType="tmRoot"/>
+      </p:par>
+    </p:tnLst>
+  </p:timing>
+</p:sld>
+</file>
+
+<file path=ppt/slides/slide6.xml><?xml version="1.0" encoding="utf-8"?>
 <p:sld xmlns:a="http://schemas.openxmlformats.org/drawingml/2006/main" xmlns:r="http://schemas.openxmlformats.org/officeDocument/2006/relationships" xmlns:p="http://schemas.openxmlformats.org/presentationml/2006/main">
   <p:cSld>
     <p:spTree>
@@ -8525,10 +10134,151 @@
   <p:clrMapOvr>
     <a:masterClrMapping/>
   </p:clrMapOvr>
+  <p:timing>
+    <p:tnLst>
+      <p:par>
+        <p:cTn id="1" dur="indefinite" restart="never" nodeType="tmRoot">
+          <p:childTnLst>
+            <p:seq concurrent="1" nextAc="seek">
+              <p:cTn id="2" dur="indefinite" nodeType="mainSeq">
+                <p:childTnLst>
+                  <p:par>
+                    <p:cTn id="3" fill="hold">
+                      <p:stCondLst>
+                        <p:cond delay="indefinite"/>
+                      </p:stCondLst>
+                      <p:childTnLst>
+                        <p:par>
+                          <p:cTn id="4" fill="hold">
+                            <p:stCondLst>
+                              <p:cond delay="0"/>
+                            </p:stCondLst>
+                            <p:childTnLst>
+                              <p:par>
+                                <p:cTn id="5" presetID="1" presetClass="entr" presetSubtype="0" fill="hold" nodeType="clickEffect">
+                                  <p:stCondLst>
+                                    <p:cond delay="0"/>
+                                  </p:stCondLst>
+                                  <p:childTnLst>
+                                    <p:set>
+                                      <p:cBhvr>
+                                        <p:cTn id="6" dur="1" fill="hold">
+                                          <p:stCondLst>
+                                            <p:cond delay="0"/>
+                                          </p:stCondLst>
+                                        </p:cTn>
+                                        <p:tgtEl>
+                                          <p:spTgt spid="3">
+                                            <p:txEl>
+                                              <p:pRg st="2" end="2"/>
+                                            </p:txEl>
+                                          </p:spTgt>
+                                        </p:tgtEl>
+                                        <p:attrNameLst>
+                                          <p:attrName>style.visibility</p:attrName>
+                                        </p:attrNameLst>
+                                      </p:cBhvr>
+                                      <p:to>
+                                        <p:strVal val="visible"/>
+                                      </p:to>
+                                    </p:set>
+                                  </p:childTnLst>
+                                </p:cTn>
+                              </p:par>
+                              <p:par>
+                                <p:cTn id="7" presetID="1" presetClass="entr" presetSubtype="0" fill="hold" nodeType="withEffect">
+                                  <p:stCondLst>
+                                    <p:cond delay="0"/>
+                                  </p:stCondLst>
+                                  <p:childTnLst>
+                                    <p:set>
+                                      <p:cBhvr>
+                                        <p:cTn id="8" dur="1" fill="hold">
+                                          <p:stCondLst>
+                                            <p:cond delay="0"/>
+                                          </p:stCondLst>
+                                        </p:cTn>
+                                        <p:tgtEl>
+                                          <p:spTgt spid="3">
+                                            <p:txEl>
+                                              <p:pRg st="3" end="3"/>
+                                            </p:txEl>
+                                          </p:spTgt>
+                                        </p:tgtEl>
+                                        <p:attrNameLst>
+                                          <p:attrName>style.visibility</p:attrName>
+                                        </p:attrNameLst>
+                                      </p:cBhvr>
+                                      <p:to>
+                                        <p:strVal val="visible"/>
+                                      </p:to>
+                                    </p:set>
+                                  </p:childTnLst>
+                                </p:cTn>
+                              </p:par>
+                              <p:par>
+                                <p:cTn id="9" presetID="1" presetClass="entr" presetSubtype="0" fill="hold" nodeType="withEffect">
+                                  <p:stCondLst>
+                                    <p:cond delay="0"/>
+                                  </p:stCondLst>
+                                  <p:childTnLst>
+                                    <p:set>
+                                      <p:cBhvr>
+                                        <p:cTn id="10" dur="1" fill="hold">
+                                          <p:stCondLst>
+                                            <p:cond delay="0"/>
+                                          </p:stCondLst>
+                                        </p:cTn>
+                                        <p:tgtEl>
+                                          <p:spTgt spid="3">
+                                            <p:txEl>
+                                              <p:pRg st="4" end="4"/>
+                                            </p:txEl>
+                                          </p:spTgt>
+                                        </p:tgtEl>
+                                        <p:attrNameLst>
+                                          <p:attrName>style.visibility</p:attrName>
+                                        </p:attrNameLst>
+                                      </p:cBhvr>
+                                      <p:to>
+                                        <p:strVal val="visible"/>
+                                      </p:to>
+                                    </p:set>
+                                  </p:childTnLst>
+                                </p:cTn>
+                              </p:par>
+                            </p:childTnLst>
+                          </p:cTn>
+                        </p:par>
+                      </p:childTnLst>
+                    </p:cTn>
+                  </p:par>
+                </p:childTnLst>
+              </p:cTn>
+              <p:prevCondLst>
+                <p:cond evt="onPrev" delay="0">
+                  <p:tgtEl>
+                    <p:sldTgt/>
+                  </p:tgtEl>
+                </p:cond>
+              </p:prevCondLst>
+              <p:nextCondLst>
+                <p:cond evt="onNext" delay="0">
+                  <p:tgtEl>
+                    <p:sldTgt/>
+                  </p:tgtEl>
+                </p:cond>
+              </p:nextCondLst>
+            </p:seq>
+          </p:childTnLst>
+        </p:cTn>
+      </p:par>
+    </p:tnLst>
+  </p:timing>
 </p:sld>
 </file>
 
-<file path=ppt/slides/slide6.xml><?xml version="1.0" encoding="utf-8"?>
+<file path=ppt/slides/slide7.xml><?xml version="1.0" encoding="utf-8"?>
 <p:sld xmlns:a="http://schemas.openxmlformats.org/drawingml/2006/main" xmlns:r="http://schemas.openxmlformats.org/officeDocument/2006/relationships" xmlns:p="http://schemas.openxmlformats.org/presentationml/2006/main">
   <p:cSld>
     <p:spTree>
@@ -9309,839 +11059,13 @@
   <p:clrMapOvr>
     <a:masterClrMapping/>
   </p:clrMapOvr>
-</p:sld>
-</file>
-
-<file path=ppt/slides/slide7.xml><?xml version="1.0" encoding="utf-8"?>
-<p:sld xmlns:a="http://schemas.openxmlformats.org/drawingml/2006/main" xmlns:r="http://schemas.openxmlformats.org/officeDocument/2006/relationships" xmlns:p="http://schemas.openxmlformats.org/presentationml/2006/main">
-  <p:cSld>
-    <p:spTree>
-      <p:nvGrpSpPr>
-        <p:cNvPr id="1" name=""/>
-        <p:cNvGrpSpPr/>
-        <p:nvPr/>
-      </p:nvGrpSpPr>
-      <p:grpSpPr>
-        <a:xfrm>
-          <a:off x="0" y="0"/>
-          <a:ext cx="0" cy="0"/>
-          <a:chOff x="0" y="0"/>
-          <a:chExt cx="0" cy="0"/>
-        </a:xfrm>
-      </p:grpSpPr>
-      <p:sp>
-        <p:nvSpPr>
-          <p:cNvPr id="2" name="Title 1">
-            <a:extLst>
-              <a:ext uri="{FF2B5EF4-FFF2-40B4-BE49-F238E27FC236}">
-                <a16:creationId xmlns:a16="http://schemas.microsoft.com/office/drawing/2014/main" id="{089FE6BE-A025-4A85-B67C-D1AFB1B45CA3}"/>
-              </a:ext>
-            </a:extLst>
-          </p:cNvPr>
-          <p:cNvSpPr>
-            <a:spLocks noGrp="1"/>
-          </p:cNvSpPr>
-          <p:nvPr>
-            <p:ph type="title"/>
-          </p:nvPr>
-        </p:nvSpPr>
-        <p:spPr/>
-        <p:txBody>
-          <a:bodyPr/>
-          <a:lstStyle/>
-          <a:p>
-            <a:r>
-              <a:rPr lang="en-US" dirty="0"/>
-              <a:t>Mission Limit</a:t>
-            </a:r>
-          </a:p>
-        </p:txBody>
-      </p:sp>
-      <p:sp>
-        <p:nvSpPr>
-          <p:cNvPr id="3" name="Content Placeholder 2">
-            <a:extLst>
-              <a:ext uri="{FF2B5EF4-FFF2-40B4-BE49-F238E27FC236}">
-                <a16:creationId xmlns:a16="http://schemas.microsoft.com/office/drawing/2014/main" id="{205F8E24-BEB0-438B-BFD9-83AEDD7D6EC5}"/>
-              </a:ext>
-            </a:extLst>
-          </p:cNvPr>
-          <p:cNvSpPr>
-            <a:spLocks noGrp="1"/>
-          </p:cNvSpPr>
-          <p:nvPr>
-            <p:ph idx="1"/>
-          </p:nvPr>
-        </p:nvSpPr>
-        <p:spPr>
-          <a:xfrm>
-            <a:off x="4718679" y="1166949"/>
-            <a:ext cx="4304413" cy="5337089"/>
-          </a:xfrm>
-        </p:spPr>
-        <p:txBody>
-          <a:bodyPr>
-            <a:normAutofit/>
-          </a:bodyPr>
-          <a:lstStyle/>
-          <a:p>
-            <a:r>
-              <a:rPr lang="en-US" sz="2800" dirty="0"/>
-              <a:t>Dictated by LV capacity (or FRC rules, i.e., 120 </a:t>
-            </a:r>
-            <a:r>
-              <a:rPr lang="en-US" sz="2800" dirty="0" err="1"/>
-              <a:t>lbm</a:t>
-            </a:r>
-            <a:r>
-              <a:rPr lang="en-US" sz="2800" dirty="0"/>
-              <a:t>)</a:t>
-            </a:r>
-          </a:p>
-          <a:p>
-            <a:r>
-              <a:rPr lang="en-US" sz="2800" dirty="0"/>
-              <a:t>Generally nonnegotiable</a:t>
-            </a:r>
-          </a:p>
-        </p:txBody>
-      </p:sp>
-      <p:grpSp>
-        <p:nvGrpSpPr>
-          <p:cNvPr id="4" name="Group 3">
-            <a:extLst>
-              <a:ext uri="{FF2B5EF4-FFF2-40B4-BE49-F238E27FC236}">
-                <a16:creationId xmlns:a16="http://schemas.microsoft.com/office/drawing/2014/main" id="{0C188F93-B9B3-48F0-9167-6CB36979790B}"/>
-              </a:ext>
-            </a:extLst>
-          </p:cNvPr>
-          <p:cNvGrpSpPr/>
-          <p:nvPr/>
-        </p:nvGrpSpPr>
-        <p:grpSpPr>
-          <a:xfrm>
-            <a:off x="136195" y="1071525"/>
-            <a:ext cx="3809636" cy="4036423"/>
-            <a:chOff x="722811" y="1447707"/>
-            <a:chExt cx="5966285" cy="5262302"/>
-          </a:xfrm>
-        </p:grpSpPr>
-        <p:cxnSp>
-          <p:nvCxnSpPr>
-            <p:cNvPr id="5" name="Straight Connector 4">
-              <a:extLst>
-                <a:ext uri="{FF2B5EF4-FFF2-40B4-BE49-F238E27FC236}">
-                  <a16:creationId xmlns:a16="http://schemas.microsoft.com/office/drawing/2014/main" id="{7AA86E86-12FC-42EA-A0D7-287C59FDF7C8}"/>
-                </a:ext>
-              </a:extLst>
-            </p:cNvPr>
-            <p:cNvCxnSpPr>
-              <a:cxnSpLocks/>
-            </p:cNvCxnSpPr>
-            <p:nvPr/>
-          </p:nvCxnSpPr>
-          <p:spPr>
-            <a:xfrm>
-              <a:off x="722811" y="1672046"/>
-              <a:ext cx="3640183" cy="0"/>
-            </a:xfrm>
-            <a:prstGeom prst="line">
-              <a:avLst/>
-            </a:prstGeom>
-            <a:ln w="25400">
-              <a:solidFill>
-                <a:schemeClr val="bg1"/>
-              </a:solidFill>
-            </a:ln>
-          </p:spPr>
-          <p:style>
-            <a:lnRef idx="1">
-              <a:schemeClr val="accent1"/>
-            </a:lnRef>
-            <a:fillRef idx="0">
-              <a:schemeClr val="accent1"/>
-            </a:fillRef>
-            <a:effectRef idx="0">
-              <a:schemeClr val="accent1"/>
-            </a:effectRef>
-            <a:fontRef idx="minor">
-              <a:schemeClr val="tx1"/>
-            </a:fontRef>
-          </p:style>
-        </p:cxnSp>
-        <p:cxnSp>
-          <p:nvCxnSpPr>
-            <p:cNvPr id="6" name="Straight Connector 5">
-              <a:extLst>
-                <a:ext uri="{FF2B5EF4-FFF2-40B4-BE49-F238E27FC236}">
-                  <a16:creationId xmlns:a16="http://schemas.microsoft.com/office/drawing/2014/main" id="{CC89B743-B611-43BF-A56C-6CFC4059482C}"/>
-                </a:ext>
-              </a:extLst>
-            </p:cNvPr>
-            <p:cNvCxnSpPr>
-              <a:cxnSpLocks/>
-            </p:cNvCxnSpPr>
-            <p:nvPr/>
-          </p:nvCxnSpPr>
-          <p:spPr>
-            <a:xfrm>
-              <a:off x="722811" y="2656115"/>
-              <a:ext cx="3640183" cy="0"/>
-            </a:xfrm>
-            <a:prstGeom prst="line">
-              <a:avLst/>
-            </a:prstGeom>
-            <a:ln w="25400">
-              <a:solidFill>
-                <a:schemeClr val="bg1"/>
-              </a:solidFill>
-            </a:ln>
-          </p:spPr>
-          <p:style>
-            <a:lnRef idx="1">
-              <a:schemeClr val="accent1"/>
-            </a:lnRef>
-            <a:fillRef idx="0">
-              <a:schemeClr val="accent1"/>
-            </a:fillRef>
-            <a:effectRef idx="0">
-              <a:schemeClr val="accent1"/>
-            </a:effectRef>
-            <a:fontRef idx="minor">
-              <a:schemeClr val="tx1"/>
-            </a:fontRef>
-          </p:style>
-        </p:cxnSp>
-        <p:cxnSp>
-          <p:nvCxnSpPr>
-            <p:cNvPr id="7" name="Straight Connector 6">
-              <a:extLst>
-                <a:ext uri="{FF2B5EF4-FFF2-40B4-BE49-F238E27FC236}">
-                  <a16:creationId xmlns:a16="http://schemas.microsoft.com/office/drawing/2014/main" id="{3B5DF38E-5B65-439F-B862-FD961DA0D30A}"/>
-                </a:ext>
-              </a:extLst>
-            </p:cNvPr>
-            <p:cNvCxnSpPr>
-              <a:cxnSpLocks/>
-            </p:cNvCxnSpPr>
-            <p:nvPr/>
-          </p:nvCxnSpPr>
-          <p:spPr>
-            <a:xfrm>
-              <a:off x="722811" y="3579223"/>
-              <a:ext cx="3640183" cy="0"/>
-            </a:xfrm>
-            <a:prstGeom prst="line">
-              <a:avLst/>
-            </a:prstGeom>
-            <a:ln w="25400">
-              <a:solidFill>
-                <a:schemeClr val="bg1"/>
-              </a:solidFill>
-            </a:ln>
-          </p:spPr>
-          <p:style>
-            <a:lnRef idx="1">
-              <a:schemeClr val="accent1"/>
-            </a:lnRef>
-            <a:fillRef idx="0">
-              <a:schemeClr val="accent1"/>
-            </a:fillRef>
-            <a:effectRef idx="0">
-              <a:schemeClr val="accent1"/>
-            </a:effectRef>
-            <a:fontRef idx="minor">
-              <a:schemeClr val="tx1"/>
-            </a:fontRef>
-          </p:style>
-        </p:cxnSp>
-        <p:cxnSp>
-          <p:nvCxnSpPr>
-            <p:cNvPr id="8" name="Straight Connector 7">
-              <a:extLst>
-                <a:ext uri="{FF2B5EF4-FFF2-40B4-BE49-F238E27FC236}">
-                  <a16:creationId xmlns:a16="http://schemas.microsoft.com/office/drawing/2014/main" id="{661FC51B-75F7-4975-AEB7-43786A4A76EA}"/>
-                </a:ext>
-              </a:extLst>
-            </p:cNvPr>
-            <p:cNvCxnSpPr>
-              <a:cxnSpLocks/>
-            </p:cNvCxnSpPr>
-            <p:nvPr/>
-          </p:nvCxnSpPr>
-          <p:spPr>
-            <a:xfrm>
-              <a:off x="722811" y="4659086"/>
-              <a:ext cx="3640183" cy="0"/>
-            </a:xfrm>
-            <a:prstGeom prst="line">
-              <a:avLst/>
-            </a:prstGeom>
-            <a:ln w="25400">
-              <a:solidFill>
-                <a:schemeClr val="bg1"/>
-              </a:solidFill>
-            </a:ln>
-          </p:spPr>
-          <p:style>
-            <a:lnRef idx="1">
-              <a:schemeClr val="accent1"/>
-            </a:lnRef>
-            <a:fillRef idx="0">
-              <a:schemeClr val="accent1"/>
-            </a:fillRef>
-            <a:effectRef idx="0">
-              <a:schemeClr val="accent1"/>
-            </a:effectRef>
-            <a:fontRef idx="minor">
-              <a:schemeClr val="tx1"/>
-            </a:fontRef>
-          </p:style>
-        </p:cxnSp>
-        <p:cxnSp>
-          <p:nvCxnSpPr>
-            <p:cNvPr id="9" name="Straight Connector 8">
-              <a:extLst>
-                <a:ext uri="{FF2B5EF4-FFF2-40B4-BE49-F238E27FC236}">
-                  <a16:creationId xmlns:a16="http://schemas.microsoft.com/office/drawing/2014/main" id="{4554647F-3C4E-410F-BD31-450B869B1FC2}"/>
-                </a:ext>
-              </a:extLst>
-            </p:cNvPr>
-            <p:cNvCxnSpPr>
-              <a:cxnSpLocks/>
-            </p:cNvCxnSpPr>
-            <p:nvPr/>
-          </p:nvCxnSpPr>
-          <p:spPr>
-            <a:xfrm>
-              <a:off x="722811" y="6479177"/>
-              <a:ext cx="3640183" cy="0"/>
-            </a:xfrm>
-            <a:prstGeom prst="line">
-              <a:avLst/>
-            </a:prstGeom>
-            <a:ln w="25400">
-              <a:solidFill>
-                <a:schemeClr val="bg1"/>
-              </a:solidFill>
-            </a:ln>
-          </p:spPr>
-          <p:style>
-            <a:lnRef idx="1">
-              <a:schemeClr val="accent1"/>
-            </a:lnRef>
-            <a:fillRef idx="0">
-              <a:schemeClr val="accent1"/>
-            </a:fillRef>
-            <a:effectRef idx="0">
-              <a:schemeClr val="accent1"/>
-            </a:effectRef>
-            <a:fontRef idx="minor">
-              <a:schemeClr val="tx1"/>
-            </a:fontRef>
-          </p:style>
-        </p:cxnSp>
-        <p:cxnSp>
-          <p:nvCxnSpPr>
-            <p:cNvPr id="10" name="Straight Arrow Connector 9">
-              <a:extLst>
-                <a:ext uri="{FF2B5EF4-FFF2-40B4-BE49-F238E27FC236}">
-                  <a16:creationId xmlns:a16="http://schemas.microsoft.com/office/drawing/2014/main" id="{880CC7A3-2D84-457C-B63E-BF0D68830012}"/>
-                </a:ext>
-              </a:extLst>
-            </p:cNvPr>
-            <p:cNvCxnSpPr/>
-            <p:nvPr/>
-          </p:nvCxnSpPr>
-          <p:spPr>
-            <a:xfrm>
-              <a:off x="1062446" y="4659086"/>
-              <a:ext cx="0" cy="1820091"/>
-            </a:xfrm>
-            <a:prstGeom prst="straightConnector1">
-              <a:avLst/>
-            </a:prstGeom>
-            <a:ln w="12700">
-              <a:solidFill>
-                <a:schemeClr val="bg1"/>
-              </a:solidFill>
-              <a:headEnd type="triangle"/>
-              <a:tailEnd type="triangle"/>
-            </a:ln>
-          </p:spPr>
-          <p:style>
-            <a:lnRef idx="1">
-              <a:schemeClr val="accent1"/>
-            </a:lnRef>
-            <a:fillRef idx="0">
-              <a:schemeClr val="accent1"/>
-            </a:fillRef>
-            <a:effectRef idx="0">
-              <a:schemeClr val="accent1"/>
-            </a:effectRef>
-            <a:fontRef idx="minor">
-              <a:schemeClr val="tx1"/>
-            </a:fontRef>
-          </p:style>
-        </p:cxnSp>
-        <p:cxnSp>
-          <p:nvCxnSpPr>
-            <p:cNvPr id="11" name="Straight Arrow Connector 10">
-              <a:extLst>
-                <a:ext uri="{FF2B5EF4-FFF2-40B4-BE49-F238E27FC236}">
-                  <a16:creationId xmlns:a16="http://schemas.microsoft.com/office/drawing/2014/main" id="{FEF24D1C-E94A-4D26-85DD-A6EC0FFD6548}"/>
-                </a:ext>
-              </a:extLst>
-            </p:cNvPr>
-            <p:cNvCxnSpPr>
-              <a:cxnSpLocks/>
-            </p:cNvCxnSpPr>
-            <p:nvPr/>
-          </p:nvCxnSpPr>
-          <p:spPr>
-            <a:xfrm>
-              <a:off x="1062446" y="3579223"/>
-              <a:ext cx="0" cy="1079863"/>
-            </a:xfrm>
-            <a:prstGeom prst="straightConnector1">
-              <a:avLst/>
-            </a:prstGeom>
-            <a:ln w="12700">
-              <a:solidFill>
-                <a:schemeClr val="bg1"/>
-              </a:solidFill>
-              <a:headEnd type="triangle"/>
-              <a:tailEnd type="triangle"/>
-            </a:ln>
-          </p:spPr>
-          <p:style>
-            <a:lnRef idx="1">
-              <a:schemeClr val="accent1"/>
-            </a:lnRef>
-            <a:fillRef idx="0">
-              <a:schemeClr val="accent1"/>
-            </a:fillRef>
-            <a:effectRef idx="0">
-              <a:schemeClr val="accent1"/>
-            </a:effectRef>
-            <a:fontRef idx="minor">
-              <a:schemeClr val="tx1"/>
-            </a:fontRef>
-          </p:style>
-        </p:cxnSp>
-        <p:cxnSp>
-          <p:nvCxnSpPr>
-            <p:cNvPr id="12" name="Straight Arrow Connector 11">
-              <a:extLst>
-                <a:ext uri="{FF2B5EF4-FFF2-40B4-BE49-F238E27FC236}">
-                  <a16:creationId xmlns:a16="http://schemas.microsoft.com/office/drawing/2014/main" id="{34BE1ED7-A173-4BE3-AF24-B047F12DCBA3}"/>
-                </a:ext>
-              </a:extLst>
-            </p:cNvPr>
-            <p:cNvCxnSpPr>
-              <a:cxnSpLocks/>
-            </p:cNvCxnSpPr>
-            <p:nvPr/>
-          </p:nvCxnSpPr>
-          <p:spPr>
-            <a:xfrm>
-              <a:off x="1062446" y="2656115"/>
-              <a:ext cx="0" cy="923108"/>
-            </a:xfrm>
-            <a:prstGeom prst="straightConnector1">
-              <a:avLst/>
-            </a:prstGeom>
-            <a:ln w="12700">
-              <a:solidFill>
-                <a:schemeClr val="bg1"/>
-              </a:solidFill>
-              <a:headEnd type="triangle"/>
-              <a:tailEnd type="triangle"/>
-            </a:ln>
-          </p:spPr>
-          <p:style>
-            <a:lnRef idx="1">
-              <a:schemeClr val="accent1"/>
-            </a:lnRef>
-            <a:fillRef idx="0">
-              <a:schemeClr val="accent1"/>
-            </a:fillRef>
-            <a:effectRef idx="0">
-              <a:schemeClr val="accent1"/>
-            </a:effectRef>
-            <a:fontRef idx="minor">
-              <a:schemeClr val="tx1"/>
-            </a:fontRef>
-          </p:style>
-        </p:cxnSp>
-        <p:cxnSp>
-          <p:nvCxnSpPr>
-            <p:cNvPr id="13" name="Straight Arrow Connector 12">
-              <a:extLst>
-                <a:ext uri="{FF2B5EF4-FFF2-40B4-BE49-F238E27FC236}">
-                  <a16:creationId xmlns:a16="http://schemas.microsoft.com/office/drawing/2014/main" id="{7A2EA275-DA21-4555-9605-7CC0A001B76A}"/>
-                </a:ext>
-              </a:extLst>
-            </p:cNvPr>
-            <p:cNvCxnSpPr>
-              <a:cxnSpLocks/>
-            </p:cNvCxnSpPr>
-            <p:nvPr/>
-          </p:nvCxnSpPr>
-          <p:spPr>
-            <a:xfrm>
-              <a:off x="1062446" y="1672046"/>
-              <a:ext cx="0" cy="984069"/>
-            </a:xfrm>
-            <a:prstGeom prst="straightConnector1">
-              <a:avLst/>
-            </a:prstGeom>
-            <a:ln w="12700">
-              <a:solidFill>
-                <a:schemeClr val="bg1"/>
-              </a:solidFill>
-              <a:headEnd type="triangle"/>
-              <a:tailEnd type="triangle"/>
-            </a:ln>
-          </p:spPr>
-          <p:style>
-            <a:lnRef idx="1">
-              <a:schemeClr val="accent1"/>
-            </a:lnRef>
-            <a:fillRef idx="0">
-              <a:schemeClr val="accent1"/>
-            </a:fillRef>
-            <a:effectRef idx="0">
-              <a:schemeClr val="accent1"/>
-            </a:effectRef>
-            <a:fontRef idx="minor">
-              <a:schemeClr val="tx1"/>
-            </a:fontRef>
-          </p:style>
-        </p:cxnSp>
-        <p:sp>
-          <p:nvSpPr>
-            <p:cNvPr id="14" name="TextBox 13">
-              <a:extLst>
-                <a:ext uri="{FF2B5EF4-FFF2-40B4-BE49-F238E27FC236}">
-                  <a16:creationId xmlns:a16="http://schemas.microsoft.com/office/drawing/2014/main" id="{AE663752-DDC3-4EC4-B016-B59E20B3CAD4}"/>
-                </a:ext>
-              </a:extLst>
-            </p:cNvPr>
-            <p:cNvSpPr txBox="1"/>
-            <p:nvPr/>
-          </p:nvSpPr>
-          <p:spPr>
-            <a:xfrm>
-              <a:off x="4286774" y="4428251"/>
-              <a:ext cx="1539204" cy="461665"/>
-            </a:xfrm>
-            <a:prstGeom prst="rect">
-              <a:avLst/>
-            </a:prstGeom>
-            <a:noFill/>
-          </p:spPr>
-          <p:txBody>
-            <a:bodyPr wrap="none" rtlCol="0">
-              <a:spAutoFit/>
-            </a:bodyPr>
-            <a:lstStyle/>
-            <a:p>
-              <a:r>
-                <a:rPr lang="en-US" sz="2400" dirty="0">
-                  <a:solidFill>
-                    <a:schemeClr val="bg1"/>
-                  </a:solidFill>
-                </a:rPr>
-                <a:t>Basic Mass</a:t>
-              </a:r>
-            </a:p>
-          </p:txBody>
-        </p:sp>
-        <p:sp>
-          <p:nvSpPr>
-            <p:cNvPr id="15" name="TextBox 14">
-              <a:extLst>
-                <a:ext uri="{FF2B5EF4-FFF2-40B4-BE49-F238E27FC236}">
-                  <a16:creationId xmlns:a16="http://schemas.microsoft.com/office/drawing/2014/main" id="{11583D1F-A1E5-4268-A71A-45F9F856C948}"/>
-                </a:ext>
-              </a:extLst>
-            </p:cNvPr>
-            <p:cNvSpPr txBox="1"/>
-            <p:nvPr/>
-          </p:nvSpPr>
-          <p:spPr>
-            <a:xfrm>
-              <a:off x="1062446" y="3857544"/>
-              <a:ext cx="3712170" cy="523220"/>
-            </a:xfrm>
-            <a:prstGeom prst="rect">
-              <a:avLst/>
-            </a:prstGeom>
-            <a:noFill/>
-          </p:spPr>
-          <p:txBody>
-            <a:bodyPr wrap="none" rtlCol="0">
-              <a:spAutoFit/>
-            </a:bodyPr>
-            <a:lstStyle/>
-            <a:p>
-              <a:r>
-                <a:rPr lang="en-US" sz="2800" dirty="0">
-                  <a:solidFill>
-                    <a:schemeClr val="bg1"/>
-                  </a:solidFill>
-                </a:rPr>
-                <a:t>Mass Growth Allowance</a:t>
-              </a:r>
-            </a:p>
-          </p:txBody>
-        </p:sp>
-        <p:sp>
-          <p:nvSpPr>
-            <p:cNvPr id="16" name="TextBox 15">
-              <a:extLst>
-                <a:ext uri="{FF2B5EF4-FFF2-40B4-BE49-F238E27FC236}">
-                  <a16:creationId xmlns:a16="http://schemas.microsoft.com/office/drawing/2014/main" id="{390297EC-8BC7-435E-ABB2-3EBCE3FBD795}"/>
-                </a:ext>
-              </a:extLst>
-            </p:cNvPr>
-            <p:cNvSpPr txBox="1"/>
-            <p:nvPr/>
-          </p:nvSpPr>
-          <p:spPr>
-            <a:xfrm>
-              <a:off x="1062446" y="2864412"/>
-              <a:ext cx="2066463" cy="523220"/>
-            </a:xfrm>
-            <a:prstGeom prst="rect">
-              <a:avLst/>
-            </a:prstGeom>
-            <a:noFill/>
-          </p:spPr>
-          <p:txBody>
-            <a:bodyPr wrap="none" rtlCol="0">
-              <a:spAutoFit/>
-            </a:bodyPr>
-            <a:lstStyle/>
-            <a:p>
-              <a:r>
-                <a:rPr lang="en-US" sz="2800" dirty="0">
-                  <a:solidFill>
-                    <a:schemeClr val="bg1"/>
-                  </a:solidFill>
-                </a:rPr>
-                <a:t>Mass Margin</a:t>
-              </a:r>
-            </a:p>
-          </p:txBody>
-        </p:sp>
-        <p:sp>
-          <p:nvSpPr>
-            <p:cNvPr id="17" name="TextBox 16">
-              <a:extLst>
-                <a:ext uri="{FF2B5EF4-FFF2-40B4-BE49-F238E27FC236}">
-                  <a16:creationId xmlns:a16="http://schemas.microsoft.com/office/drawing/2014/main" id="{F6F6B66F-E9C2-457C-834D-50E37637D792}"/>
-                </a:ext>
-              </a:extLst>
-            </p:cNvPr>
-            <p:cNvSpPr txBox="1"/>
-            <p:nvPr/>
-          </p:nvSpPr>
-          <p:spPr>
-            <a:xfrm>
-              <a:off x="1062446" y="1879639"/>
-              <a:ext cx="2178738" cy="523220"/>
-            </a:xfrm>
-            <a:prstGeom prst="rect">
-              <a:avLst/>
-            </a:prstGeom>
-            <a:noFill/>
-          </p:spPr>
-          <p:txBody>
-            <a:bodyPr wrap="none" rtlCol="0">
-              <a:spAutoFit/>
-            </a:bodyPr>
-            <a:lstStyle/>
-            <a:p>
-              <a:r>
-                <a:rPr lang="en-US" sz="2800" dirty="0">
-                  <a:solidFill>
-                    <a:schemeClr val="bg1"/>
-                  </a:solidFill>
-                </a:rPr>
-                <a:t>Mass Reserve</a:t>
-              </a:r>
-            </a:p>
-          </p:txBody>
-        </p:sp>
-        <p:sp>
-          <p:nvSpPr>
-            <p:cNvPr id="18" name="TextBox 17">
-              <a:extLst>
-                <a:ext uri="{FF2B5EF4-FFF2-40B4-BE49-F238E27FC236}">
-                  <a16:creationId xmlns:a16="http://schemas.microsoft.com/office/drawing/2014/main" id="{26A53355-AA24-4885-86ED-DF822FC4544D}"/>
-                </a:ext>
-              </a:extLst>
-            </p:cNvPr>
-            <p:cNvSpPr txBox="1"/>
-            <p:nvPr/>
-          </p:nvSpPr>
-          <p:spPr>
-            <a:xfrm>
-              <a:off x="4287900" y="3348389"/>
-              <a:ext cx="2097690" cy="461665"/>
-            </a:xfrm>
-            <a:prstGeom prst="rect">
-              <a:avLst/>
-            </a:prstGeom>
-            <a:noFill/>
-          </p:spPr>
-          <p:txBody>
-            <a:bodyPr wrap="none" rtlCol="0">
-              <a:spAutoFit/>
-            </a:bodyPr>
-            <a:lstStyle/>
-            <a:p>
-              <a:r>
-                <a:rPr lang="en-US" sz="2400" dirty="0">
-                  <a:solidFill>
-                    <a:schemeClr val="bg1"/>
-                  </a:solidFill>
-                </a:rPr>
-                <a:t>Predicted Mass</a:t>
-              </a:r>
-            </a:p>
-          </p:txBody>
-        </p:sp>
-        <p:sp>
-          <p:nvSpPr>
-            <p:cNvPr id="19" name="TextBox 18">
-              <a:extLst>
-                <a:ext uri="{FF2B5EF4-FFF2-40B4-BE49-F238E27FC236}">
-                  <a16:creationId xmlns:a16="http://schemas.microsoft.com/office/drawing/2014/main" id="{50F1536B-1DAD-4ED4-BFBB-C04E0D5B8EF7}"/>
-                </a:ext>
-              </a:extLst>
-            </p:cNvPr>
-            <p:cNvSpPr txBox="1"/>
-            <p:nvPr/>
-          </p:nvSpPr>
-          <p:spPr>
-            <a:xfrm>
-              <a:off x="4316428" y="2425282"/>
-              <a:ext cx="2134046" cy="461665"/>
-            </a:xfrm>
-            <a:prstGeom prst="rect">
-              <a:avLst/>
-            </a:prstGeom>
-            <a:noFill/>
-          </p:spPr>
-          <p:txBody>
-            <a:bodyPr wrap="none" rtlCol="0">
-              <a:spAutoFit/>
-            </a:bodyPr>
-            <a:lstStyle/>
-            <a:p>
-              <a:r>
-                <a:rPr lang="en-US" sz="2400" dirty="0">
-                  <a:solidFill>
-                    <a:schemeClr val="bg1"/>
-                  </a:solidFill>
-                </a:rPr>
-                <a:t>Allowable Mass</a:t>
-              </a:r>
-            </a:p>
-          </p:txBody>
-        </p:sp>
-        <p:sp>
-          <p:nvSpPr>
-            <p:cNvPr id="20" name="TextBox 19">
-              <a:extLst>
-                <a:ext uri="{FF2B5EF4-FFF2-40B4-BE49-F238E27FC236}">
-                  <a16:creationId xmlns:a16="http://schemas.microsoft.com/office/drawing/2014/main" id="{438C7260-05D7-4A21-839A-2BB7A3EC235C}"/>
-                </a:ext>
-              </a:extLst>
-            </p:cNvPr>
-            <p:cNvSpPr txBox="1"/>
-            <p:nvPr/>
-          </p:nvSpPr>
-          <p:spPr>
-            <a:xfrm>
-              <a:off x="4289540" y="1447707"/>
-              <a:ext cx="2399556" cy="601875"/>
-            </a:xfrm>
-            <a:prstGeom prst="rect">
-              <a:avLst/>
-            </a:prstGeom>
-            <a:noFill/>
-          </p:spPr>
-          <p:txBody>
-            <a:bodyPr wrap="none" rtlCol="0">
-              <a:spAutoFit/>
-            </a:bodyPr>
-            <a:lstStyle/>
-            <a:p>
-              <a:r>
-                <a:rPr lang="en-US" sz="2400" dirty="0">
-                  <a:solidFill>
-                    <a:srgbClr val="FF0000"/>
-                  </a:solidFill>
-                </a:rPr>
-                <a:t>Mission Limit</a:t>
-              </a:r>
-            </a:p>
-          </p:txBody>
-        </p:sp>
-        <p:sp>
-          <p:nvSpPr>
-            <p:cNvPr id="21" name="TextBox 20">
-              <a:extLst>
-                <a:ext uri="{FF2B5EF4-FFF2-40B4-BE49-F238E27FC236}">
-                  <a16:creationId xmlns:a16="http://schemas.microsoft.com/office/drawing/2014/main" id="{FE87E137-6CA1-49AA-9413-F651315D3064}"/>
-                </a:ext>
-              </a:extLst>
-            </p:cNvPr>
-            <p:cNvSpPr txBox="1"/>
-            <p:nvPr/>
-          </p:nvSpPr>
-          <p:spPr>
-            <a:xfrm>
-              <a:off x="4305318" y="6248344"/>
-              <a:ext cx="340158" cy="461665"/>
-            </a:xfrm>
-            <a:prstGeom prst="rect">
-              <a:avLst/>
-            </a:prstGeom>
-            <a:noFill/>
-          </p:spPr>
-          <p:txBody>
-            <a:bodyPr wrap="none" rtlCol="0">
-              <a:spAutoFit/>
-            </a:bodyPr>
-            <a:lstStyle/>
-            <a:p>
-              <a:r>
-                <a:rPr lang="en-US" sz="2400" dirty="0">
-                  <a:solidFill>
-                    <a:schemeClr val="bg1"/>
-                  </a:solidFill>
-                </a:rPr>
-                <a:t>0</a:t>
-              </a:r>
-            </a:p>
-          </p:txBody>
-        </p:sp>
-      </p:grpSp>
-    </p:spTree>
-    <p:extLst>
-      <p:ext uri="{BB962C8B-B14F-4D97-AF65-F5344CB8AC3E}">
-        <p14:creationId xmlns:p14="http://schemas.microsoft.com/office/powerpoint/2010/main" val="340227859"/>
-      </p:ext>
-    </p:extLst>
-  </p:cSld>
-  <p:clrMapOvr>
-    <a:masterClrMapping/>
-  </p:clrMapOvr>
+  <p:timing>
+    <p:tnLst>
+      <p:par>
+        <p:cTn id="1" dur="indefinite" restart="never" nodeType="tmRoot"/>
+      </p:par>
+    </p:tnLst>
+  </p:timing>
 </p:sld>
 </file>
 
@@ -10185,7 +11109,7 @@
           <a:p>
             <a:r>
               <a:rPr lang="en-US" dirty="0"/>
-              <a:t>Mass Reserve</a:t>
+              <a:t>Mission Limit</a:t>
             </a:r>
           </a:p>
         </p:txBody>
@@ -10214,102 +11138,27 @@
         </p:spPr>
         <p:txBody>
           <a:bodyPr>
-            <a:normAutofit fontScale="92500" lnSpcReduction="10000"/>
+            <a:normAutofit/>
           </a:bodyPr>
           <a:lstStyle/>
           <a:p>
             <a:r>
               <a:rPr lang="en-US" sz="2800" dirty="0"/>
-              <a:t>Set at the </a:t>
-            </a:r>
-            <a:r>
-              <a:rPr lang="en-US" sz="2800" i="1" dirty="0"/>
-              <a:t>system</a:t>
+              <a:t>Dictated by LV capacity (or FRC rules, i.e., 120 </a:t>
+            </a:r>
+            <a:r>
+              <a:rPr lang="en-US" sz="2800" dirty="0" err="1"/>
+              <a:t>lbm</a:t>
             </a:r>
             <a:r>
               <a:rPr lang="en-US" sz="2800" dirty="0"/>
-              <a:t> or </a:t>
-            </a:r>
-            <a:r>
-              <a:rPr lang="en-US" sz="2800" i="1" dirty="0"/>
-              <a:t>project </a:t>
-            </a:r>
+              <a:t>)</a:t>
+            </a:r>
+          </a:p>
+          <a:p>
             <a:r>
               <a:rPr lang="en-US" sz="2800" dirty="0"/>
-              <a:t>level</a:t>
-            </a:r>
-          </a:p>
-          <a:p>
-            <a:r>
-              <a:rPr lang="en-US" sz="2800" dirty="0"/>
-              <a:t>Often fairly small, e.g. 5%</a:t>
-            </a:r>
-          </a:p>
-          <a:p>
-            <a:r>
-              <a:rPr lang="en-US" sz="2800" dirty="0"/>
-              <a:t>Designed to account for:</a:t>
-            </a:r>
-          </a:p>
-          <a:p>
-            <a:pPr lvl="1"/>
-            <a:r>
-              <a:rPr lang="en-US" sz="2400" dirty="0"/>
-              <a:t>Measurement uncertainty</a:t>
-            </a:r>
-          </a:p>
-          <a:p>
-            <a:pPr lvl="1"/>
-            <a:r>
-              <a:rPr lang="en-US" sz="2400" dirty="0"/>
-              <a:t>Non-SV stuff</a:t>
-            </a:r>
-          </a:p>
-          <a:p>
-            <a:pPr lvl="2"/>
-            <a:r>
-              <a:rPr lang="en-US" sz="2000" dirty="0"/>
-              <a:t>E.g. SV-to-LV </a:t>
-            </a:r>
-            <a:r>
-              <a:rPr lang="en-US" sz="2000" dirty="0" err="1"/>
-              <a:t>umbilicals</a:t>
-            </a:r>
-            <a:endParaRPr lang="en-US" sz="2000" dirty="0"/>
-          </a:p>
-          <a:p>
-            <a:pPr lvl="1"/>
-            <a:r>
-              <a:rPr lang="en-US" sz="2400" dirty="0"/>
-              <a:t>Operational contingency</a:t>
-            </a:r>
-          </a:p>
-          <a:p>
-            <a:pPr lvl="2"/>
-            <a:r>
-              <a:rPr lang="en-US" sz="2000" dirty="0"/>
-              <a:t>LVs have slightly less lift capacity in strong winds</a:t>
-            </a:r>
-          </a:p>
-          <a:p>
-            <a:pPr lvl="1"/>
-            <a:r>
-              <a:rPr lang="en-US" sz="2400" dirty="0"/>
-              <a:t>In our case, might also include repairs etc. at comp</a:t>
-            </a:r>
-          </a:p>
-          <a:p>
-            <a:r>
-              <a:rPr lang="en-US" sz="2800" dirty="0"/>
-              <a:t>Mass reserve should </a:t>
-            </a:r>
-            <a:r>
-              <a:rPr lang="en-US" sz="2800" i="1" dirty="0"/>
-              <a:t>not </a:t>
-            </a:r>
-            <a:r>
-              <a:rPr lang="en-US" sz="2800" dirty="0"/>
-              <a:t>be invaded by design</a:t>
+              <a:t>Generally nonnegotiable</a:t>
             </a:r>
           </a:p>
         </p:txBody>
@@ -10329,9 +11178,9 @@
         <p:grpSpPr>
           <a:xfrm>
             <a:off x="136195" y="1071525"/>
-            <a:ext cx="4118022" cy="4036423"/>
+            <a:ext cx="3809636" cy="4036423"/>
             <a:chOff x="722811" y="1447707"/>
-            <a:chExt cx="6449249" cy="5262302"/>
+            <a:chExt cx="5966285" cy="5262302"/>
           </a:xfrm>
         </p:grpSpPr>
         <p:cxnSp>
@@ -10859,7 +11708,7 @@
           <p:spPr>
             <a:xfrm>
               <a:off x="1062446" y="1879639"/>
-              <a:ext cx="3412129" cy="682124"/>
+              <a:ext cx="2178738" cy="523220"/>
             </a:xfrm>
             <a:prstGeom prst="rect">
               <a:avLst/>
@@ -10875,7 +11724,7 @@
               <a:r>
                 <a:rPr lang="en-US" sz="2800" dirty="0">
                   <a:solidFill>
-                    <a:srgbClr val="FF0000"/>
+                    <a:schemeClr val="bg1"/>
                   </a:solidFill>
                 </a:rPr>
                 <a:t>Mass Reserve</a:t>
@@ -10976,7 +11825,7 @@
           <p:spPr>
             <a:xfrm>
               <a:off x="4289540" y="1447707"/>
-              <a:ext cx="2882520" cy="601875"/>
+              <a:ext cx="2399556" cy="601875"/>
             </a:xfrm>
             <a:prstGeom prst="rect">
               <a:avLst/>
@@ -10992,7 +11841,7 @@
               <a:r>
                 <a:rPr lang="en-US" sz="2400" dirty="0">
                   <a:solidFill>
-                    <a:schemeClr val="bg1"/>
+                    <a:srgbClr val="FF0000"/>
                   </a:solidFill>
                 </a:rPr>
                 <a:t>Mission Limit</a:t>
@@ -11043,13 +11892,20 @@
     </p:spTree>
     <p:extLst>
       <p:ext uri="{BB962C8B-B14F-4D97-AF65-F5344CB8AC3E}">
-        <p14:creationId xmlns:p14="http://schemas.microsoft.com/office/powerpoint/2010/main" val="1837816180"/>
+        <p14:creationId xmlns:p14="http://schemas.microsoft.com/office/powerpoint/2010/main" val="340227859"/>
       </p:ext>
     </p:extLst>
   </p:cSld>
   <p:clrMapOvr>
     <a:masterClrMapping/>
   </p:clrMapOvr>
+  <p:timing>
+    <p:tnLst>
+      <p:par>
+        <p:cTn id="1" dur="indefinite" restart="never" nodeType="tmRoot"/>
+      </p:par>
+    </p:tnLst>
+  </p:timing>
 </p:sld>
 </file>
 
@@ -11093,7 +11949,7 @@
           <a:p>
             <a:r>
               <a:rPr lang="en-US" dirty="0"/>
-              <a:t>Allowable Mass</a:t>
+              <a:t>Mass Reserve</a:t>
             </a:r>
           </a:p>
         </p:txBody>
@@ -11122,45 +11978,102 @@
         </p:spPr>
         <p:txBody>
           <a:bodyPr>
-            <a:normAutofit lnSpcReduction="10000"/>
+            <a:normAutofit fontScale="92500" lnSpcReduction="10000"/>
           </a:bodyPr>
           <a:lstStyle/>
           <a:p>
             <a:r>
               <a:rPr lang="en-US" sz="2800" dirty="0"/>
-              <a:t>The mission limit minus the mass reserve</a:t>
-            </a:r>
-          </a:p>
-          <a:p>
+              <a:t>Set at the </a:t>
+            </a:r>
+            <a:r>
+              <a:rPr lang="en-US" sz="2800" i="1" dirty="0"/>
+              <a:t>system</a:t>
+            </a:r>
             <a:r>
               <a:rPr lang="en-US" sz="2800" dirty="0"/>
-              <a:t>The mass that “you have to work with”</a:t>
-            </a:r>
-          </a:p>
-          <a:p>
+              <a:t> or </a:t>
+            </a:r>
+            <a:r>
+              <a:rPr lang="en-US" sz="2800" i="1" dirty="0"/>
+              <a:t>project </a:t>
+            </a:r>
             <a:r>
               <a:rPr lang="en-US" sz="2800" dirty="0"/>
-              <a:t>This is allocated out to subsystems</a:t>
+              <a:t>level</a:t>
+            </a:r>
+          </a:p>
+          <a:p>
+            <a:r>
+              <a:rPr lang="en-US" sz="2800" dirty="0"/>
+              <a:t>Often fairly small, e.g. 5%</a:t>
+            </a:r>
+          </a:p>
+          <a:p>
+            <a:r>
+              <a:rPr lang="en-US" sz="2800" dirty="0"/>
+              <a:t>Designed to account for:</a:t>
             </a:r>
           </a:p>
           <a:p>
             <a:pPr lvl="1"/>
             <a:r>
               <a:rPr lang="en-US" sz="2400" dirty="0"/>
-              <a:t>Chunks of it are then allocated out to e.g. boxes</a:t>
+              <a:t>Measurement uncertainty</a:t>
+            </a:r>
+          </a:p>
+          <a:p>
+            <a:pPr lvl="1"/>
+            <a:r>
+              <a:rPr lang="en-US" sz="2400" dirty="0"/>
+              <a:t>Non-SV stuff</a:t>
+            </a:r>
+          </a:p>
+          <a:p>
+            <a:pPr lvl="2"/>
+            <a:r>
+              <a:rPr lang="en-US" sz="2000" dirty="0"/>
+              <a:t>E.g. SV-to-LV </a:t>
+            </a:r>
+            <a:r>
+              <a:rPr lang="en-US" sz="2000" dirty="0" err="1"/>
+              <a:t>umbilicals</a:t>
+            </a:r>
+            <a:endParaRPr lang="en-US" sz="2000" dirty="0"/>
+          </a:p>
+          <a:p>
+            <a:pPr lvl="1"/>
+            <a:r>
+              <a:rPr lang="en-US" sz="2400" dirty="0"/>
+              <a:t>Operational contingency</a:t>
+            </a:r>
+          </a:p>
+          <a:p>
+            <a:pPr lvl="2"/>
+            <a:r>
+              <a:rPr lang="en-US" sz="2000" dirty="0"/>
+              <a:t>LVs have slightly less lift capacity in strong winds</a:t>
+            </a:r>
+          </a:p>
+          <a:p>
+            <a:pPr lvl="1"/>
+            <a:r>
+              <a:rPr lang="en-US" sz="2400" dirty="0"/>
+              <a:t>In our case, might also include repairs etc. at comp</a:t>
             </a:r>
           </a:p>
           <a:p>
             <a:r>
               <a:rPr lang="en-US" sz="2800" dirty="0"/>
-              <a:t>No need to allocate less than 100% of allowable mass</a:t>
-            </a:r>
-          </a:p>
-          <a:p>
-            <a:pPr lvl="1"/>
-            <a:r>
-              <a:rPr lang="en-US" sz="2400" dirty="0"/>
-              <a:t>That’s what mass margin is for</a:t>
+              <a:t>Mass reserve should </a:t>
+            </a:r>
+            <a:r>
+              <a:rPr lang="en-US" sz="2800" i="1" dirty="0"/>
+              <a:t>not </a:t>
+            </a:r>
+            <a:r>
+              <a:rPr lang="en-US" sz="2800" dirty="0"/>
+              <a:t>be invaded by design</a:t>
             </a:r>
           </a:p>
         </p:txBody>
@@ -11180,9 +12093,9 @@
         <p:grpSpPr>
           <a:xfrm>
             <a:off x="136195" y="1071525"/>
-            <a:ext cx="4428669" cy="4036423"/>
+            <a:ext cx="4118022" cy="4036423"/>
             <a:chOff x="722811" y="1447707"/>
-            <a:chExt cx="6935754" cy="5262302"/>
+            <a:chExt cx="6449249" cy="5262302"/>
           </a:xfrm>
         </p:grpSpPr>
         <p:cxnSp>
@@ -11726,7 +12639,7 @@
               <a:r>
                 <a:rPr lang="en-US" sz="2800" dirty="0">
                   <a:solidFill>
-                    <a:schemeClr val="bg1"/>
+                    <a:srgbClr val="FF0000"/>
                   </a:solidFill>
                 </a:rPr>
                 <a:t>Mass Reserve</a:t>
@@ -11788,7 +12701,7 @@
           <p:spPr>
             <a:xfrm>
               <a:off x="4316428" y="2425282"/>
-              <a:ext cx="3342137" cy="601875"/>
+              <a:ext cx="2134046" cy="461665"/>
             </a:xfrm>
             <a:prstGeom prst="rect">
               <a:avLst/>
@@ -11804,7 +12717,7 @@
               <a:r>
                 <a:rPr lang="en-US" sz="2400" dirty="0">
                   <a:solidFill>
-                    <a:srgbClr val="FF0000"/>
+                    <a:schemeClr val="bg1"/>
                   </a:solidFill>
                 </a:rPr>
                 <a:t>Allowable Mass</a:t>
@@ -11894,13 +12807,20 @@
     </p:spTree>
     <p:extLst>
       <p:ext uri="{BB962C8B-B14F-4D97-AF65-F5344CB8AC3E}">
-        <p14:creationId xmlns:p14="http://schemas.microsoft.com/office/powerpoint/2010/main" val="73504398"/>
+        <p14:creationId xmlns:p14="http://schemas.microsoft.com/office/powerpoint/2010/main" val="1837816180"/>
       </p:ext>
     </p:extLst>
   </p:cSld>
   <p:clrMapOvr>
     <a:masterClrMapping/>
   </p:clrMapOvr>
+  <p:timing>
+    <p:tnLst>
+      <p:par>
+        <p:cTn id="1" dur="indefinite" restart="never" nodeType="tmRoot"/>
+      </p:par>
+    </p:tnLst>
+  </p:timing>
 </p:sld>
 </file>
 

</xml_diff>